<commit_message>
Updated image for first DAG.
</commit_message>
<xml_diff>
--- a/Figures/jags_for_ecologists_figures.pptx
+++ b/Figures/jags_for_ecologists_figures.pptx
@@ -104,13 +104,18 @@
       </a:defRPr>
     </a:lvl9pPr>
   </p:defaultTextStyle>
+  <p:extLst>
+    <p:ext uri="{EFAFB233-063F-42B5-8137-9DF3F51BA10A}">
+      <p15:sldGuideLst xmlns:p15="http://schemas.microsoft.com/office/powerpoint/2012/main"/>
+    </p:ext>
+  </p:extLst>
 </p:presentation>
 </file>
 
 <file path=ppt/revisionInfo.xml><?xml version="1.0" encoding="utf-8"?>
 <p1510:revInfo xmlns:a="http://schemas.openxmlformats.org/drawingml/2006/main" xmlns:r="http://schemas.openxmlformats.org/officeDocument/2006/relationships" xmlns:p1510="http://schemas.microsoft.com/office/powerpoint/2015/10/main">
   <p1510:revLst>
-    <p1510:client id="{1EE535DA-61B9-44E7-BA05-D30B0AFACE23}" v="1" dt="2023-02-17T16:31:19.247"/>
+    <p1510:client id="{1EE535DA-61B9-44E7-BA05-D30B0AFACE23}" v="7" dt="2023-02-17T16:44:22.497"/>
   </p1510:revLst>
 </p1510:revInfo>
 </file>
@@ -120,18 +125,18 @@
   <pc:docChgLst>
     <pc:chgData name="Simon Bonner" userId="c968d0cc-44b1-4a19-b224-50fd2dc43281" providerId="ADAL" clId="{1EE535DA-61B9-44E7-BA05-D30B0AFACE23}"/>
     <pc:docChg chg="modSld">
-      <pc:chgData name="Simon Bonner" userId="c968d0cc-44b1-4a19-b224-50fd2dc43281" providerId="ADAL" clId="{1EE535DA-61B9-44E7-BA05-D30B0AFACE23}" dt="2023-02-17T16:31:32.307" v="2" actId="12789"/>
+      <pc:chgData name="Simon Bonner" userId="c968d0cc-44b1-4a19-b224-50fd2dc43281" providerId="ADAL" clId="{1EE535DA-61B9-44E7-BA05-D30B0AFACE23}" dt="2023-02-17T16:44:22.497" v="8" actId="20577"/>
       <pc:docMkLst>
         <pc:docMk/>
       </pc:docMkLst>
       <pc:sldChg chg="addSp modSp mod">
-        <pc:chgData name="Simon Bonner" userId="c968d0cc-44b1-4a19-b224-50fd2dc43281" providerId="ADAL" clId="{1EE535DA-61B9-44E7-BA05-D30B0AFACE23}" dt="2023-02-17T16:31:32.307" v="2" actId="12789"/>
+        <pc:chgData name="Simon Bonner" userId="c968d0cc-44b1-4a19-b224-50fd2dc43281" providerId="ADAL" clId="{1EE535DA-61B9-44E7-BA05-D30B0AFACE23}" dt="2023-02-17T16:44:22.497" v="8" actId="20577"/>
         <pc:sldMkLst>
           <pc:docMk/>
           <pc:sldMk cId="3848685715" sldId="256"/>
         </pc:sldMkLst>
         <pc:spChg chg="mod">
-          <ac:chgData name="Simon Bonner" userId="c968d0cc-44b1-4a19-b224-50fd2dc43281" providerId="ADAL" clId="{1EE535DA-61B9-44E7-BA05-D30B0AFACE23}" dt="2023-02-17T16:31:19.247" v="0" actId="164"/>
+          <ac:chgData name="Simon Bonner" userId="c968d0cc-44b1-4a19-b224-50fd2dc43281" providerId="ADAL" clId="{1EE535DA-61B9-44E7-BA05-D30B0AFACE23}" dt="2023-02-17T16:44:22.497" v="8" actId="20577"/>
           <ac:spMkLst>
             <pc:docMk/>
             <pc:sldMk cId="3848685715" sldId="256"/>
@@ -139,7 +144,7 @@
           </ac:spMkLst>
         </pc:spChg>
         <pc:spChg chg="mod">
-          <ac:chgData name="Simon Bonner" userId="c968d0cc-44b1-4a19-b224-50fd2dc43281" providerId="ADAL" clId="{1EE535DA-61B9-44E7-BA05-D30B0AFACE23}" dt="2023-02-17T16:31:19.247" v="0" actId="164"/>
+          <ac:chgData name="Simon Bonner" userId="c968d0cc-44b1-4a19-b224-50fd2dc43281" providerId="ADAL" clId="{1EE535DA-61B9-44E7-BA05-D30B0AFACE23}" dt="2023-02-17T16:44:22.497" v="8" actId="20577"/>
           <ac:spMkLst>
             <pc:docMk/>
             <pc:sldMk cId="3848685715" sldId="256"/>
@@ -147,7 +152,7 @@
           </ac:spMkLst>
         </pc:spChg>
         <pc:spChg chg="mod">
-          <ac:chgData name="Simon Bonner" userId="c968d0cc-44b1-4a19-b224-50fd2dc43281" providerId="ADAL" clId="{1EE535DA-61B9-44E7-BA05-D30B0AFACE23}" dt="2023-02-17T16:31:19.247" v="0" actId="164"/>
+          <ac:chgData name="Simon Bonner" userId="c968d0cc-44b1-4a19-b224-50fd2dc43281" providerId="ADAL" clId="{1EE535DA-61B9-44E7-BA05-D30B0AFACE23}" dt="2023-02-17T16:44:22.497" v="8" actId="20577"/>
           <ac:spMkLst>
             <pc:docMk/>
             <pc:sldMk cId="3848685715" sldId="256"/>
@@ -155,7 +160,7 @@
           </ac:spMkLst>
         </pc:spChg>
         <pc:spChg chg="mod">
-          <ac:chgData name="Simon Bonner" userId="c968d0cc-44b1-4a19-b224-50fd2dc43281" providerId="ADAL" clId="{1EE535DA-61B9-44E7-BA05-D30B0AFACE23}" dt="2023-02-17T16:31:19.247" v="0" actId="164"/>
+          <ac:chgData name="Simon Bonner" userId="c968d0cc-44b1-4a19-b224-50fd2dc43281" providerId="ADAL" clId="{1EE535DA-61B9-44E7-BA05-D30B0AFACE23}" dt="2023-02-17T16:44:22.497" v="8" actId="20577"/>
           <ac:spMkLst>
             <pc:docMk/>
             <pc:sldMk cId="3848685715" sldId="256"/>
@@ -163,7 +168,7 @@
           </ac:spMkLst>
         </pc:spChg>
         <pc:spChg chg="mod">
-          <ac:chgData name="Simon Bonner" userId="c968d0cc-44b1-4a19-b224-50fd2dc43281" providerId="ADAL" clId="{1EE535DA-61B9-44E7-BA05-D30B0AFACE23}" dt="2023-02-17T16:31:19.247" v="0" actId="164"/>
+          <ac:chgData name="Simon Bonner" userId="c968d0cc-44b1-4a19-b224-50fd2dc43281" providerId="ADAL" clId="{1EE535DA-61B9-44E7-BA05-D30B0AFACE23}" dt="2023-02-17T16:44:22.497" v="8" actId="20577"/>
           <ac:spMkLst>
             <pc:docMk/>
             <pc:sldMk cId="3848685715" sldId="256"/>
@@ -171,7 +176,7 @@
           </ac:spMkLst>
         </pc:spChg>
         <pc:spChg chg="mod">
-          <ac:chgData name="Simon Bonner" userId="c968d0cc-44b1-4a19-b224-50fd2dc43281" providerId="ADAL" clId="{1EE535DA-61B9-44E7-BA05-D30B0AFACE23}" dt="2023-02-17T16:31:19.247" v="0" actId="164"/>
+          <ac:chgData name="Simon Bonner" userId="c968d0cc-44b1-4a19-b224-50fd2dc43281" providerId="ADAL" clId="{1EE535DA-61B9-44E7-BA05-D30B0AFACE23}" dt="2023-02-17T16:44:22.497" v="8" actId="20577"/>
           <ac:spMkLst>
             <pc:docMk/>
             <pc:sldMk cId="3848685715" sldId="256"/>
@@ -179,7 +184,7 @@
           </ac:spMkLst>
         </pc:spChg>
         <pc:spChg chg="mod">
-          <ac:chgData name="Simon Bonner" userId="c968d0cc-44b1-4a19-b224-50fd2dc43281" providerId="ADAL" clId="{1EE535DA-61B9-44E7-BA05-D30B0AFACE23}" dt="2023-02-17T16:31:19.247" v="0" actId="164"/>
+          <ac:chgData name="Simon Bonner" userId="c968d0cc-44b1-4a19-b224-50fd2dc43281" providerId="ADAL" clId="{1EE535DA-61B9-44E7-BA05-D30B0AFACE23}" dt="2023-02-17T16:44:22.497" v="8" actId="20577"/>
           <ac:spMkLst>
             <pc:docMk/>
             <pc:sldMk cId="3848685715" sldId="256"/>
@@ -187,7 +192,7 @@
           </ac:spMkLst>
         </pc:spChg>
         <pc:spChg chg="mod">
-          <ac:chgData name="Simon Bonner" userId="c968d0cc-44b1-4a19-b224-50fd2dc43281" providerId="ADAL" clId="{1EE535DA-61B9-44E7-BA05-D30B0AFACE23}" dt="2023-02-17T16:31:19.247" v="0" actId="164"/>
+          <ac:chgData name="Simon Bonner" userId="c968d0cc-44b1-4a19-b224-50fd2dc43281" providerId="ADAL" clId="{1EE535DA-61B9-44E7-BA05-D30B0AFACE23}" dt="2023-02-17T16:44:22.497" v="8" actId="20577"/>
           <ac:spMkLst>
             <pc:docMk/>
             <pc:sldMk cId="3848685715" sldId="256"/>
@@ -195,7 +200,7 @@
           </ac:spMkLst>
         </pc:spChg>
         <pc:spChg chg="mod">
-          <ac:chgData name="Simon Bonner" userId="c968d0cc-44b1-4a19-b224-50fd2dc43281" providerId="ADAL" clId="{1EE535DA-61B9-44E7-BA05-D30B0AFACE23}" dt="2023-02-17T16:31:19.247" v="0" actId="164"/>
+          <ac:chgData name="Simon Bonner" userId="c968d0cc-44b1-4a19-b224-50fd2dc43281" providerId="ADAL" clId="{1EE535DA-61B9-44E7-BA05-D30B0AFACE23}" dt="2023-02-17T16:44:22.497" v="8" actId="20577"/>
           <ac:spMkLst>
             <pc:docMk/>
             <pc:sldMk cId="3848685715" sldId="256"/>
@@ -203,7 +208,7 @@
           </ac:spMkLst>
         </pc:spChg>
         <pc:spChg chg="mod">
-          <ac:chgData name="Simon Bonner" userId="c968d0cc-44b1-4a19-b224-50fd2dc43281" providerId="ADAL" clId="{1EE535DA-61B9-44E7-BA05-D30B0AFACE23}" dt="2023-02-17T16:31:19.247" v="0" actId="164"/>
+          <ac:chgData name="Simon Bonner" userId="c968d0cc-44b1-4a19-b224-50fd2dc43281" providerId="ADAL" clId="{1EE535DA-61B9-44E7-BA05-D30B0AFACE23}" dt="2023-02-17T16:44:22.497" v="8" actId="20577"/>
           <ac:spMkLst>
             <pc:docMk/>
             <pc:sldMk cId="3848685715" sldId="256"/>
@@ -211,7 +216,7 @@
           </ac:spMkLst>
         </pc:spChg>
         <pc:spChg chg="mod">
-          <ac:chgData name="Simon Bonner" userId="c968d0cc-44b1-4a19-b224-50fd2dc43281" providerId="ADAL" clId="{1EE535DA-61B9-44E7-BA05-D30B0AFACE23}" dt="2023-02-17T16:31:19.247" v="0" actId="164"/>
+          <ac:chgData name="Simon Bonner" userId="c968d0cc-44b1-4a19-b224-50fd2dc43281" providerId="ADAL" clId="{1EE535DA-61B9-44E7-BA05-D30B0AFACE23}" dt="2023-02-17T16:44:22.497" v="8" actId="20577"/>
           <ac:spMkLst>
             <pc:docMk/>
             <pc:sldMk cId="3848685715" sldId="256"/>
@@ -219,7 +224,7 @@
           </ac:spMkLst>
         </pc:spChg>
         <pc:spChg chg="mod">
-          <ac:chgData name="Simon Bonner" userId="c968d0cc-44b1-4a19-b224-50fd2dc43281" providerId="ADAL" clId="{1EE535DA-61B9-44E7-BA05-D30B0AFACE23}" dt="2023-02-17T16:31:19.247" v="0" actId="164"/>
+          <ac:chgData name="Simon Bonner" userId="c968d0cc-44b1-4a19-b224-50fd2dc43281" providerId="ADAL" clId="{1EE535DA-61B9-44E7-BA05-D30B0AFACE23}" dt="2023-02-17T16:44:22.497" v="8" actId="20577"/>
           <ac:spMkLst>
             <pc:docMk/>
             <pc:sldMk cId="3848685715" sldId="256"/>
@@ -227,7 +232,7 @@
           </ac:spMkLst>
         </pc:spChg>
         <pc:grpChg chg="add mod">
-          <ac:chgData name="Simon Bonner" userId="c968d0cc-44b1-4a19-b224-50fd2dc43281" providerId="ADAL" clId="{1EE535DA-61B9-44E7-BA05-D30B0AFACE23}" dt="2023-02-17T16:31:32.307" v="2" actId="12789"/>
+          <ac:chgData name="Simon Bonner" userId="c968d0cc-44b1-4a19-b224-50fd2dc43281" providerId="ADAL" clId="{1EE535DA-61B9-44E7-BA05-D30B0AFACE23}" dt="2023-02-17T16:44:22.497" v="8" actId="20577"/>
           <ac:grpSpMkLst>
             <pc:docMk/>
             <pc:sldMk cId="3848685715" sldId="256"/>
@@ -235,7 +240,7 @@
           </ac:grpSpMkLst>
         </pc:grpChg>
         <pc:cxnChg chg="mod">
-          <ac:chgData name="Simon Bonner" userId="c968d0cc-44b1-4a19-b224-50fd2dc43281" providerId="ADAL" clId="{1EE535DA-61B9-44E7-BA05-D30B0AFACE23}" dt="2023-02-17T16:31:19.247" v="0" actId="164"/>
+          <ac:chgData name="Simon Bonner" userId="c968d0cc-44b1-4a19-b224-50fd2dc43281" providerId="ADAL" clId="{1EE535DA-61B9-44E7-BA05-D30B0AFACE23}" dt="2023-02-17T16:44:22.497" v="8" actId="20577"/>
           <ac:cxnSpMkLst>
             <pc:docMk/>
             <pc:sldMk cId="3848685715" sldId="256"/>
@@ -243,7 +248,7 @@
           </ac:cxnSpMkLst>
         </pc:cxnChg>
         <pc:cxnChg chg="mod">
-          <ac:chgData name="Simon Bonner" userId="c968d0cc-44b1-4a19-b224-50fd2dc43281" providerId="ADAL" clId="{1EE535DA-61B9-44E7-BA05-D30B0AFACE23}" dt="2023-02-17T16:31:19.247" v="0" actId="164"/>
+          <ac:chgData name="Simon Bonner" userId="c968d0cc-44b1-4a19-b224-50fd2dc43281" providerId="ADAL" clId="{1EE535DA-61B9-44E7-BA05-D30B0AFACE23}" dt="2023-02-17T16:44:22.497" v="8" actId="20577"/>
           <ac:cxnSpMkLst>
             <pc:docMk/>
             <pc:sldMk cId="3848685715" sldId="256"/>
@@ -251,7 +256,7 @@
           </ac:cxnSpMkLst>
         </pc:cxnChg>
         <pc:cxnChg chg="mod">
-          <ac:chgData name="Simon Bonner" userId="c968d0cc-44b1-4a19-b224-50fd2dc43281" providerId="ADAL" clId="{1EE535DA-61B9-44E7-BA05-D30B0AFACE23}" dt="2023-02-17T16:31:19.247" v="0" actId="164"/>
+          <ac:chgData name="Simon Bonner" userId="c968d0cc-44b1-4a19-b224-50fd2dc43281" providerId="ADAL" clId="{1EE535DA-61B9-44E7-BA05-D30B0AFACE23}" dt="2023-02-17T16:44:22.497" v="8" actId="20577"/>
           <ac:cxnSpMkLst>
             <pc:docMk/>
             <pc:sldMk cId="3848685715" sldId="256"/>
@@ -259,7 +264,7 @@
           </ac:cxnSpMkLst>
         </pc:cxnChg>
         <pc:cxnChg chg="mod">
-          <ac:chgData name="Simon Bonner" userId="c968d0cc-44b1-4a19-b224-50fd2dc43281" providerId="ADAL" clId="{1EE535DA-61B9-44E7-BA05-D30B0AFACE23}" dt="2023-02-17T16:31:19.247" v="0" actId="164"/>
+          <ac:chgData name="Simon Bonner" userId="c968d0cc-44b1-4a19-b224-50fd2dc43281" providerId="ADAL" clId="{1EE535DA-61B9-44E7-BA05-D30B0AFACE23}" dt="2023-02-17T16:44:22.497" v="8" actId="20577"/>
           <ac:cxnSpMkLst>
             <pc:docMk/>
             <pc:sldMk cId="3848685715" sldId="256"/>
@@ -3558,8 +3563,8 @@
             </a:p>
           </p:txBody>
         </p:sp>
-        <mc:AlternateContent xmlns:mc="http://schemas.openxmlformats.org/markup-compatibility/2006">
-          <mc:Choice xmlns:a14="http://schemas.microsoft.com/office/drawing/2010/main" Requires="a14">
+        <mc:AlternateContent xmlns:mc="http://schemas.openxmlformats.org/markup-compatibility/2006" xmlns:a14="http://schemas.microsoft.com/office/drawing/2010/main">
+          <mc:Choice Requires="a14">
             <p:sp>
               <p:nvSpPr>
                 <p:cNvPr id="5" name="TextBox 4">
@@ -3588,6 +3593,7 @@
                 </a:bodyPr>
                 <a:lstStyle/>
                 <a:p>
+                  <a:pPr/>
                   <a14:m>
                     <m:oMathPara xmlns:m="http://schemas.openxmlformats.org/officeDocument/2006/math">
                       <m:oMathParaPr>
@@ -3627,7 +3633,7 @@
               </p:txBody>
             </p:sp>
           </mc:Choice>
-          <mc:Fallback>
+          <mc:Fallback xmlns="">
             <p:sp>
               <p:nvSpPr>
                 <p:cNvPr id="5" name="TextBox 4">
@@ -3672,8 +3678,8 @@
             </p:sp>
           </mc:Fallback>
         </mc:AlternateContent>
-        <mc:AlternateContent xmlns:mc="http://schemas.openxmlformats.org/markup-compatibility/2006">
-          <mc:Choice xmlns:a14="http://schemas.microsoft.com/office/drawing/2010/main" Requires="a14">
+        <mc:AlternateContent xmlns:mc="http://schemas.openxmlformats.org/markup-compatibility/2006" xmlns:a14="http://schemas.microsoft.com/office/drawing/2010/main">
+          <mc:Choice Requires="a14">
             <p:sp>
               <p:nvSpPr>
                 <p:cNvPr id="7" name="TextBox 6">
@@ -3702,6 +3708,7 @@
                 </a:bodyPr>
                 <a:lstStyle/>
                 <a:p>
+                  <a:pPr/>
                   <a14:m>
                     <m:oMathPara xmlns:m="http://schemas.openxmlformats.org/officeDocument/2006/math">
                       <m:oMathParaPr>
@@ -3742,7 +3749,7 @@
               </p:txBody>
             </p:sp>
           </mc:Choice>
-          <mc:Fallback>
+          <mc:Fallback xmlns="">
             <p:sp>
               <p:nvSpPr>
                 <p:cNvPr id="7" name="TextBox 6">
@@ -3787,8 +3794,8 @@
             </p:sp>
           </mc:Fallback>
         </mc:AlternateContent>
-        <mc:AlternateContent xmlns:mc="http://schemas.openxmlformats.org/markup-compatibility/2006">
-          <mc:Choice xmlns:a14="http://schemas.microsoft.com/office/drawing/2010/main" Requires="a14">
+        <mc:AlternateContent xmlns:mc="http://schemas.openxmlformats.org/markup-compatibility/2006" xmlns:a14="http://schemas.microsoft.com/office/drawing/2010/main">
+          <mc:Choice Requires="a14">
             <p:sp>
               <p:nvSpPr>
                 <p:cNvPr id="9" name="TextBox 8">
@@ -3817,6 +3824,7 @@
                 </a:bodyPr>
                 <a:lstStyle/>
                 <a:p>
+                  <a:pPr/>
                   <a14:m>
                     <m:oMathPara xmlns:m="http://schemas.openxmlformats.org/officeDocument/2006/math">
                       <m:oMathParaPr>
@@ -3856,7 +3864,7 @@
               </p:txBody>
             </p:sp>
           </mc:Choice>
-          <mc:Fallback>
+          <mc:Fallback xmlns="">
             <p:sp>
               <p:nvSpPr>
                 <p:cNvPr id="9" name="TextBox 8">
@@ -3901,8 +3909,8 @@
             </p:sp>
           </mc:Fallback>
         </mc:AlternateContent>
-        <mc:AlternateContent xmlns:mc="http://schemas.openxmlformats.org/markup-compatibility/2006">
-          <mc:Choice xmlns:a14="http://schemas.microsoft.com/office/drawing/2010/main" Requires="a14">
+        <mc:AlternateContent xmlns:mc="http://schemas.openxmlformats.org/markup-compatibility/2006" xmlns:a14="http://schemas.microsoft.com/office/drawing/2010/main">
+          <mc:Choice Requires="a14">
             <p:sp>
               <p:nvSpPr>
                 <p:cNvPr id="10" name="Oval 9">
@@ -4012,7 +4020,7 @@
               </p:txBody>
             </p:sp>
           </mc:Choice>
-          <mc:Fallback>
+          <mc:Fallback xmlns="">
             <p:sp>
               <p:nvSpPr>
                 <p:cNvPr id="10" name="Oval 9">
@@ -4166,8 +4174,8 @@
             </a:p>
           </p:txBody>
         </p:sp>
-        <mc:AlternateContent xmlns:mc="http://schemas.openxmlformats.org/markup-compatibility/2006">
-          <mc:Choice xmlns:a14="http://schemas.microsoft.com/office/drawing/2010/main" Requires="a14">
+        <mc:AlternateContent xmlns:mc="http://schemas.openxmlformats.org/markup-compatibility/2006" xmlns:a14="http://schemas.microsoft.com/office/drawing/2010/main">
+          <mc:Choice Requires="a14">
             <p:sp>
               <p:nvSpPr>
                 <p:cNvPr id="14" name="Oval 13">
@@ -4277,7 +4285,7 @@
               </p:txBody>
             </p:sp>
           </mc:Choice>
-          <mc:Fallback>
+          <mc:Fallback xmlns="">
             <p:sp>
               <p:nvSpPr>
                 <p:cNvPr id="14" name="Oval 13">
@@ -4578,7 +4586,7 @@
               <p:spPr>
                 <a:xfrm>
                   <a:off x="3132312" y="3908770"/>
-                  <a:ext cx="1276247" cy="369332"/>
+                  <a:ext cx="1395703" cy="369332"/>
                 </a:xfrm>
                 <a:prstGeom prst="rect">
                   <a:avLst/>
@@ -4591,6 +4599,7 @@
                 </a:bodyPr>
                 <a:lstStyle/>
                 <a:p>
+                  <a:pPr/>
                   <a14:m>
                     <m:oMathPara xmlns:m="http://schemas.openxmlformats.org/officeDocument/2006/math">
                       <m:oMathParaPr>
@@ -4607,13 +4616,7 @@
                           <a:rPr lang="en-CA" b="0" i="1" smtClean="0">
                             <a:latin typeface="Cambria Math" panose="02040503050406030204" pitchFamily="18" charset="0"/>
                           </a:rPr>
-                          <m:t>=1,…,</m:t>
-                        </m:r>
-                        <m:r>
-                          <a:rPr lang="en-CA" b="0" i="1" smtClean="0">
-                            <a:latin typeface="Cambria Math" panose="02040503050406030204" pitchFamily="18" charset="0"/>
-                          </a:rPr>
-                          <m:t>𝑛</m:t>
+                          <m:t>=1,…,10</m:t>
                         </m:r>
                       </m:oMath>
                     </m:oMathPara>
@@ -4641,7 +4644,7 @@
               <p:spPr>
                 <a:xfrm>
                   <a:off x="3132312" y="3908770"/>
-                  <a:ext cx="1276247" cy="369332"/>
+                  <a:ext cx="1395703" cy="369332"/>
                 </a:xfrm>
                 <a:prstGeom prst="rect">
                   <a:avLst/>
@@ -4737,7 +4740,7 @@
               <p:spPr>
                 <a:xfrm>
                   <a:off x="5274530" y="3908770"/>
-                  <a:ext cx="1337161" cy="369332"/>
+                  <a:ext cx="1395703" cy="369332"/>
                 </a:xfrm>
                 <a:prstGeom prst="rect">
                   <a:avLst/>
@@ -4750,6 +4753,7 @@
                 </a:bodyPr>
                 <a:lstStyle/>
                 <a:p>
+                  <a:pPr/>
                   <a14:m>
                     <m:oMathPara xmlns:m="http://schemas.openxmlformats.org/officeDocument/2006/math">
                       <m:oMathParaPr>
@@ -4766,13 +4770,7 @@
                           <a:rPr lang="en-CA" b="0" i="1" smtClean="0">
                             <a:latin typeface="Cambria Math" panose="02040503050406030204" pitchFamily="18" charset="0"/>
                           </a:rPr>
-                          <m:t>=1,…,</m:t>
-                        </m:r>
-                        <m:r>
-                          <a:rPr lang="en-CA" b="0" i="1" smtClean="0">
-                            <a:latin typeface="Cambria Math" panose="02040503050406030204" pitchFamily="18" charset="0"/>
-                          </a:rPr>
-                          <m:t>𝑚</m:t>
+                          <m:t>=1,…,15</m:t>
                         </m:r>
                       </m:oMath>
                     </m:oMathPara>
@@ -4800,7 +4798,7 @@
               <p:spPr>
                 <a:xfrm>
                   <a:off x="5274530" y="3908770"/>
-                  <a:ext cx="1337161" cy="369332"/>
+                  <a:ext cx="1395703" cy="369332"/>
                 </a:xfrm>
                 <a:prstGeom prst="rect">
                   <a:avLst/>

</xml_diff>

<commit_message>
Added DAG for Exercise 2.
</commit_message>
<xml_diff>
--- a/Figures/jags_for_ecologists_figures.pptx
+++ b/Figures/jags_for_ecologists_figures.pptx
@@ -6,6 +6,7 @@
   </p:sldMasterIdLst>
   <p:sldIdLst>
     <p:sldId id="256" r:id="rId2"/>
+    <p:sldId id="257" r:id="rId3"/>
   </p:sldIdLst>
   <p:sldSz cx="12192000" cy="6858000"/>
   <p:notesSz cx="6858000" cy="9144000"/>
@@ -115,7 +116,7 @@
 <file path=ppt/revisionInfo.xml><?xml version="1.0" encoding="utf-8"?>
 <p1510:revInfo xmlns:a="http://schemas.openxmlformats.org/drawingml/2006/main" xmlns:r="http://schemas.openxmlformats.org/officeDocument/2006/relationships" xmlns:p1510="http://schemas.microsoft.com/office/powerpoint/2015/10/main">
   <p1510:revLst>
-    <p1510:client id="{1EE535DA-61B9-44E7-BA05-D30B0AFACE23}" v="7" dt="2023-02-17T16:44:22.497"/>
+    <p1510:client id="{21C03C2C-B54E-0141-9F1A-D4B48D7F07BB}" v="41" dt="2023-02-21T15:14:29.364"/>
   </p1510:revLst>
 </p1510:revInfo>
 </file>
@@ -274,6 +275,238 @@
       </pc:sldChg>
     </pc:docChg>
   </pc:docChgLst>
+  <pc:docChgLst>
+    <pc:chgData name="Simon Bonner" userId="c968d0cc-44b1-4a19-b224-50fd2dc43281" providerId="ADAL" clId="{21C03C2C-B54E-0141-9F1A-D4B48D7F07BB}"/>
+    <pc:docChg chg="undo custSel addSld modSld">
+      <pc:chgData name="Simon Bonner" userId="c968d0cc-44b1-4a19-b224-50fd2dc43281" providerId="ADAL" clId="{21C03C2C-B54E-0141-9F1A-D4B48D7F07BB}" dt="2023-02-21T15:15:23.092" v="87" actId="1076"/>
+      <pc:docMkLst>
+        <pc:docMk/>
+      </pc:docMkLst>
+      <pc:sldChg chg="addSp delSp modSp add mod">
+        <pc:chgData name="Simon Bonner" userId="c968d0cc-44b1-4a19-b224-50fd2dc43281" providerId="ADAL" clId="{21C03C2C-B54E-0141-9F1A-D4B48D7F07BB}" dt="2023-02-21T15:15:23.092" v="87" actId="1076"/>
+        <pc:sldMkLst>
+          <pc:docMk/>
+          <pc:sldMk cId="2718581900" sldId="257"/>
+        </pc:sldMkLst>
+        <pc:spChg chg="mod topLvl">
+          <ac:chgData name="Simon Bonner" userId="c968d0cc-44b1-4a19-b224-50fd2dc43281" providerId="ADAL" clId="{21C03C2C-B54E-0141-9F1A-D4B48D7F07BB}" dt="2023-02-21T15:11:02.905" v="21" actId="1076"/>
+          <ac:spMkLst>
+            <pc:docMk/>
+            <pc:sldMk cId="2718581900" sldId="257"/>
+            <ac:spMk id="4" creationId="{B7DC34CB-47DE-F49C-DF3B-CF0D0DE1CF12}"/>
+          </ac:spMkLst>
+        </pc:spChg>
+        <pc:spChg chg="mod topLvl">
+          <ac:chgData name="Simon Bonner" userId="c968d0cc-44b1-4a19-b224-50fd2dc43281" providerId="ADAL" clId="{21C03C2C-B54E-0141-9F1A-D4B48D7F07BB}" dt="2023-02-21T15:12:31.219" v="43" actId="1076"/>
+          <ac:spMkLst>
+            <pc:docMk/>
+            <pc:sldMk cId="2718581900" sldId="257"/>
+            <ac:spMk id="5" creationId="{EF38647B-2D14-4F29-A4C4-F04426FA4E51}"/>
+          </ac:spMkLst>
+        </pc:spChg>
+        <pc:spChg chg="add mod">
+          <ac:chgData name="Simon Bonner" userId="c968d0cc-44b1-4a19-b224-50fd2dc43281" providerId="ADAL" clId="{21C03C2C-B54E-0141-9F1A-D4B48D7F07BB}" dt="2023-02-21T15:11:36.746" v="28" actId="1076"/>
+          <ac:spMkLst>
+            <pc:docMk/>
+            <pc:sldMk cId="2718581900" sldId="257"/>
+            <ac:spMk id="6" creationId="{666CB5AE-6497-7D11-B6A5-9DFEFEC9C4B4}"/>
+          </ac:spMkLst>
+        </pc:spChg>
+        <pc:spChg chg="mod topLvl">
+          <ac:chgData name="Simon Bonner" userId="c968d0cc-44b1-4a19-b224-50fd2dc43281" providerId="ADAL" clId="{21C03C2C-B54E-0141-9F1A-D4B48D7F07BB}" dt="2023-02-21T15:14:45.798" v="83" actId="1076"/>
+          <ac:spMkLst>
+            <pc:docMk/>
+            <pc:sldMk cId="2718581900" sldId="257"/>
+            <ac:spMk id="7" creationId="{9DA5E3A8-7CF9-B3D6-CE7D-C5092FC5A82D}"/>
+          </ac:spMkLst>
+        </pc:spChg>
+        <pc:spChg chg="add mod">
+          <ac:chgData name="Simon Bonner" userId="c968d0cc-44b1-4a19-b224-50fd2dc43281" providerId="ADAL" clId="{21C03C2C-B54E-0141-9F1A-D4B48D7F07BB}" dt="2023-02-21T15:12:25.492" v="42" actId="1076"/>
+          <ac:spMkLst>
+            <pc:docMk/>
+            <pc:sldMk cId="2718581900" sldId="257"/>
+            <ac:spMk id="8" creationId="{6BD53912-FF0E-EC58-92F6-8A4A18485BC2}"/>
+          </ac:spMkLst>
+        </pc:spChg>
+        <pc:spChg chg="del mod topLvl">
+          <ac:chgData name="Simon Bonner" userId="c968d0cc-44b1-4a19-b224-50fd2dc43281" providerId="ADAL" clId="{21C03C2C-B54E-0141-9F1A-D4B48D7F07BB}" dt="2023-02-21T15:09:48.416" v="5" actId="478"/>
+          <ac:spMkLst>
+            <pc:docMk/>
+            <pc:sldMk cId="2718581900" sldId="257"/>
+            <ac:spMk id="9" creationId="{6F622C43-87C8-4E56-499D-4EC67C69D287}"/>
+          </ac:spMkLst>
+        </pc:spChg>
+        <pc:spChg chg="mod topLvl">
+          <ac:chgData name="Simon Bonner" userId="c968d0cc-44b1-4a19-b224-50fd2dc43281" providerId="ADAL" clId="{21C03C2C-B54E-0141-9F1A-D4B48D7F07BB}" dt="2023-02-21T15:09:56.532" v="9" actId="20577"/>
+          <ac:spMkLst>
+            <pc:docMk/>
+            <pc:sldMk cId="2718581900" sldId="257"/>
+            <ac:spMk id="10" creationId="{D0B009ED-32B6-ECFB-EFEF-EE08DEB5111B}"/>
+          </ac:spMkLst>
+        </pc:spChg>
+        <pc:spChg chg="mod topLvl">
+          <ac:chgData name="Simon Bonner" userId="c968d0cc-44b1-4a19-b224-50fd2dc43281" providerId="ADAL" clId="{21C03C2C-B54E-0141-9F1A-D4B48D7F07BB}" dt="2023-02-21T15:14:45.798" v="83" actId="1076"/>
+          <ac:spMkLst>
+            <pc:docMk/>
+            <pc:sldMk cId="2718581900" sldId="257"/>
+            <ac:spMk id="12" creationId="{C7E76004-2E3B-FC1A-EF5E-019620BEC9BF}"/>
+          </ac:spMkLst>
+        </pc:spChg>
+        <pc:spChg chg="del mod topLvl">
+          <ac:chgData name="Simon Bonner" userId="c968d0cc-44b1-4a19-b224-50fd2dc43281" providerId="ADAL" clId="{21C03C2C-B54E-0141-9F1A-D4B48D7F07BB}" dt="2023-02-21T15:09:43.706" v="3" actId="478"/>
+          <ac:spMkLst>
+            <pc:docMk/>
+            <pc:sldMk cId="2718581900" sldId="257"/>
+            <ac:spMk id="13" creationId="{08DDD2B2-401C-6D66-D880-EE579EB7F11C}"/>
+          </ac:spMkLst>
+        </pc:spChg>
+        <pc:spChg chg="del mod topLvl">
+          <ac:chgData name="Simon Bonner" userId="c968d0cc-44b1-4a19-b224-50fd2dc43281" providerId="ADAL" clId="{21C03C2C-B54E-0141-9F1A-D4B48D7F07BB}" dt="2023-02-21T15:09:43.706" v="3" actId="478"/>
+          <ac:spMkLst>
+            <pc:docMk/>
+            <pc:sldMk cId="2718581900" sldId="257"/>
+            <ac:spMk id="14" creationId="{5CB0F94E-E46B-D2EC-F7F7-03AA7ED965A1}"/>
+          </ac:spMkLst>
+        </pc:spChg>
+        <pc:spChg chg="add mod">
+          <ac:chgData name="Simon Bonner" userId="c968d0cc-44b1-4a19-b224-50fd2dc43281" providerId="ADAL" clId="{21C03C2C-B54E-0141-9F1A-D4B48D7F07BB}" dt="2023-02-21T15:14:45.798" v="83" actId="1076"/>
+          <ac:spMkLst>
+            <pc:docMk/>
+            <pc:sldMk cId="2718581900" sldId="257"/>
+            <ac:spMk id="24" creationId="{0366CFE7-0B94-71CC-C53D-E1DAA8698E24}"/>
+          </ac:spMkLst>
+        </pc:spChg>
+        <pc:spChg chg="add mod">
+          <ac:chgData name="Simon Bonner" userId="c968d0cc-44b1-4a19-b224-50fd2dc43281" providerId="ADAL" clId="{21C03C2C-B54E-0141-9F1A-D4B48D7F07BB}" dt="2023-02-21T15:14:45.798" v="83" actId="1076"/>
+          <ac:spMkLst>
+            <pc:docMk/>
+            <pc:sldMk cId="2718581900" sldId="257"/>
+            <ac:spMk id="25" creationId="{7DECB3BC-7DE9-3EDB-F779-0B2177FDBBDC}"/>
+          </ac:spMkLst>
+        </pc:spChg>
+        <pc:spChg chg="mod topLvl">
+          <ac:chgData name="Simon Bonner" userId="c968d0cc-44b1-4a19-b224-50fd2dc43281" providerId="ADAL" clId="{21C03C2C-B54E-0141-9F1A-D4B48D7F07BB}" dt="2023-02-21T15:15:23.092" v="87" actId="1076"/>
+          <ac:spMkLst>
+            <pc:docMk/>
+            <pc:sldMk cId="2718581900" sldId="257"/>
+            <ac:spMk id="26" creationId="{F5773DBF-A89C-20F7-96F4-F9EC52BF69B1}"/>
+          </ac:spMkLst>
+        </pc:spChg>
+        <pc:spChg chg="mod topLvl">
+          <ac:chgData name="Simon Bonner" userId="c968d0cc-44b1-4a19-b224-50fd2dc43281" providerId="ADAL" clId="{21C03C2C-B54E-0141-9F1A-D4B48D7F07BB}" dt="2023-02-21T15:11:22.760" v="26" actId="1076"/>
+          <ac:spMkLst>
+            <pc:docMk/>
+            <pc:sldMk cId="2718581900" sldId="257"/>
+            <ac:spMk id="27" creationId="{2C98168B-D35A-922E-D777-FFA7B4287DDB}"/>
+          </ac:spMkLst>
+        </pc:spChg>
+        <pc:spChg chg="del mod topLvl">
+          <ac:chgData name="Simon Bonner" userId="c968d0cc-44b1-4a19-b224-50fd2dc43281" providerId="ADAL" clId="{21C03C2C-B54E-0141-9F1A-D4B48D7F07BB}" dt="2023-02-21T15:09:37.520" v="2" actId="478"/>
+          <ac:spMkLst>
+            <pc:docMk/>
+            <pc:sldMk cId="2718581900" sldId="257"/>
+            <ac:spMk id="28" creationId="{87A040D5-A650-248A-DB2F-7F313345BDED}"/>
+          </ac:spMkLst>
+        </pc:spChg>
+        <pc:spChg chg="del mod topLvl">
+          <ac:chgData name="Simon Bonner" userId="c968d0cc-44b1-4a19-b224-50fd2dc43281" providerId="ADAL" clId="{21C03C2C-B54E-0141-9F1A-D4B48D7F07BB}" dt="2023-02-21T15:09:43.706" v="3" actId="478"/>
+          <ac:spMkLst>
+            <pc:docMk/>
+            <pc:sldMk cId="2718581900" sldId="257"/>
+            <ac:spMk id="29" creationId="{DABF256C-AD45-D0B8-DD76-6821DD3D2A98}"/>
+          </ac:spMkLst>
+        </pc:spChg>
+        <pc:spChg chg="add mod">
+          <ac:chgData name="Simon Bonner" userId="c968d0cc-44b1-4a19-b224-50fd2dc43281" providerId="ADAL" clId="{21C03C2C-B54E-0141-9F1A-D4B48D7F07BB}" dt="2023-02-21T15:14:45.798" v="83" actId="1076"/>
+          <ac:spMkLst>
+            <pc:docMk/>
+            <pc:sldMk cId="2718581900" sldId="257"/>
+            <ac:spMk id="31" creationId="{0D1D3CC1-3ECD-9E99-924E-F8375F53B4F4}"/>
+          </ac:spMkLst>
+        </pc:spChg>
+        <pc:spChg chg="add mod">
+          <ac:chgData name="Simon Bonner" userId="c968d0cc-44b1-4a19-b224-50fd2dc43281" providerId="ADAL" clId="{21C03C2C-B54E-0141-9F1A-D4B48D7F07BB}" dt="2023-02-21T15:14:45.798" v="83" actId="1076"/>
+          <ac:spMkLst>
+            <pc:docMk/>
+            <pc:sldMk cId="2718581900" sldId="257"/>
+            <ac:spMk id="32" creationId="{4CF229E6-3F8D-CE6C-F3AE-141C4A636B0F}"/>
+          </ac:spMkLst>
+        </pc:spChg>
+        <pc:grpChg chg="del">
+          <ac:chgData name="Simon Bonner" userId="c968d0cc-44b1-4a19-b224-50fd2dc43281" providerId="ADAL" clId="{21C03C2C-B54E-0141-9F1A-D4B48D7F07BB}" dt="2023-02-21T15:09:34.749" v="1" actId="165"/>
+          <ac:grpSpMkLst>
+            <pc:docMk/>
+            <pc:sldMk cId="2718581900" sldId="257"/>
+            <ac:grpSpMk id="30" creationId="{01BB1BFE-9E39-C744-A3C4-F6E6FE0C1D3F}"/>
+          </ac:grpSpMkLst>
+        </pc:grpChg>
+        <pc:cxnChg chg="add del mod">
+          <ac:chgData name="Simon Bonner" userId="c968d0cc-44b1-4a19-b224-50fd2dc43281" providerId="ADAL" clId="{21C03C2C-B54E-0141-9F1A-D4B48D7F07BB}" dt="2023-02-21T15:12:52.691" v="45" actId="11529"/>
+          <ac:cxnSpMkLst>
+            <pc:docMk/>
+            <pc:sldMk cId="2718581900" sldId="257"/>
+            <ac:cxnSpMk id="15" creationId="{9B4330E5-C9B5-A5AF-8D6D-52291C62D1BD}"/>
+          </ac:cxnSpMkLst>
+        </pc:cxnChg>
+        <pc:cxnChg chg="mod topLvl">
+          <ac:chgData name="Simon Bonner" userId="c968d0cc-44b1-4a19-b224-50fd2dc43281" providerId="ADAL" clId="{21C03C2C-B54E-0141-9F1A-D4B48D7F07BB}" dt="2023-02-21T15:11:02.905" v="21" actId="1076"/>
+          <ac:cxnSpMkLst>
+            <pc:docMk/>
+            <pc:sldMk cId="2718581900" sldId="257"/>
+            <ac:cxnSpMk id="16" creationId="{ADBEDA71-E44D-5775-EE9B-F7C90EC434CA}"/>
+          </ac:cxnSpMkLst>
+        </pc:cxnChg>
+        <pc:cxnChg chg="mod topLvl">
+          <ac:chgData name="Simon Bonner" userId="c968d0cc-44b1-4a19-b224-50fd2dc43281" providerId="ADAL" clId="{21C03C2C-B54E-0141-9F1A-D4B48D7F07BB}" dt="2023-02-21T15:15:02.985" v="86" actId="14100"/>
+          <ac:cxnSpMkLst>
+            <pc:docMk/>
+            <pc:sldMk cId="2718581900" sldId="257"/>
+            <ac:cxnSpMk id="17" creationId="{D58A0CDD-7120-AE0D-6488-D818C68CA3C9}"/>
+          </ac:cxnSpMkLst>
+        </pc:cxnChg>
+        <pc:cxnChg chg="add mod">
+          <ac:chgData name="Simon Bonner" userId="c968d0cc-44b1-4a19-b224-50fd2dc43281" providerId="ADAL" clId="{21C03C2C-B54E-0141-9F1A-D4B48D7F07BB}" dt="2023-02-21T15:13:01.743" v="48" actId="14100"/>
+          <ac:cxnSpMkLst>
+            <pc:docMk/>
+            <pc:sldMk cId="2718581900" sldId="257"/>
+            <ac:cxnSpMk id="18" creationId="{EB7DAEEE-7B91-59AC-03D2-FE624A485EA7}"/>
+          </ac:cxnSpMkLst>
+        </pc:cxnChg>
+        <pc:cxnChg chg="del mod topLvl">
+          <ac:chgData name="Simon Bonner" userId="c968d0cc-44b1-4a19-b224-50fd2dc43281" providerId="ADAL" clId="{21C03C2C-B54E-0141-9F1A-D4B48D7F07BB}" dt="2023-02-21T15:09:43.706" v="3" actId="478"/>
+          <ac:cxnSpMkLst>
+            <pc:docMk/>
+            <pc:sldMk cId="2718581900" sldId="257"/>
+            <ac:cxnSpMk id="19" creationId="{8A8D6F8B-F330-BD9B-9C41-F3E0E1A5E615}"/>
+          </ac:cxnSpMkLst>
+        </pc:cxnChg>
+        <pc:cxnChg chg="del mod topLvl">
+          <ac:chgData name="Simon Bonner" userId="c968d0cc-44b1-4a19-b224-50fd2dc43281" providerId="ADAL" clId="{21C03C2C-B54E-0141-9F1A-D4B48D7F07BB}" dt="2023-02-21T15:09:43.706" v="3" actId="478"/>
+          <ac:cxnSpMkLst>
+            <pc:docMk/>
+            <pc:sldMk cId="2718581900" sldId="257"/>
+            <ac:cxnSpMk id="23" creationId="{03DF1B1E-E6CE-60F3-0493-BB5999F199D7}"/>
+          </ac:cxnSpMkLst>
+        </pc:cxnChg>
+        <pc:cxnChg chg="add mod">
+          <ac:chgData name="Simon Bonner" userId="c968d0cc-44b1-4a19-b224-50fd2dc43281" providerId="ADAL" clId="{21C03C2C-B54E-0141-9F1A-D4B48D7F07BB}" dt="2023-02-21T15:14:53.120" v="84" actId="14100"/>
+          <ac:cxnSpMkLst>
+            <pc:docMk/>
+            <pc:sldMk cId="2718581900" sldId="257"/>
+            <ac:cxnSpMk id="33" creationId="{9561C585-8886-7A28-61BA-C330B780C927}"/>
+          </ac:cxnSpMkLst>
+        </pc:cxnChg>
+        <pc:cxnChg chg="add mod">
+          <ac:chgData name="Simon Bonner" userId="c968d0cc-44b1-4a19-b224-50fd2dc43281" providerId="ADAL" clId="{21C03C2C-B54E-0141-9F1A-D4B48D7F07BB}" dt="2023-02-21T15:14:57.216" v="85" actId="14100"/>
+          <ac:cxnSpMkLst>
+            <pc:docMk/>
+            <pc:sldMk cId="2718581900" sldId="257"/>
+            <ac:cxnSpMk id="36" creationId="{DA288777-66A9-C4FD-EFDF-9974BF412930}"/>
+          </ac:cxnSpMkLst>
+        </pc:cxnChg>
+      </pc:sldChg>
+    </pc:docChg>
+  </pc:docChgLst>
 </pc:chgInfo>
 </file>
 
@@ -424,7 +657,7 @@
           <a:p>
             <a:fld id="{68217EAF-5F0D-4A28-B856-1C00EE8A7931}" type="datetimeFigureOut">
               <a:rPr lang="en-US" smtClean="0"/>
-              <a:t>2/17/2023</a:t>
+              <a:t>2/21/23</a:t>
             </a:fld>
             <a:endParaRPr lang="en-US"/>
           </a:p>
@@ -622,7 +855,7 @@
           <a:p>
             <a:fld id="{68217EAF-5F0D-4A28-B856-1C00EE8A7931}" type="datetimeFigureOut">
               <a:rPr lang="en-US" smtClean="0"/>
-              <a:t>2/17/2023</a:t>
+              <a:t>2/21/23</a:t>
             </a:fld>
             <a:endParaRPr lang="en-US"/>
           </a:p>
@@ -830,7 +1063,7 @@
           <a:p>
             <a:fld id="{68217EAF-5F0D-4A28-B856-1C00EE8A7931}" type="datetimeFigureOut">
               <a:rPr lang="en-US" smtClean="0"/>
-              <a:t>2/17/2023</a:t>
+              <a:t>2/21/23</a:t>
             </a:fld>
             <a:endParaRPr lang="en-US"/>
           </a:p>
@@ -1028,7 +1261,7 @@
           <a:p>
             <a:fld id="{68217EAF-5F0D-4A28-B856-1C00EE8A7931}" type="datetimeFigureOut">
               <a:rPr lang="en-US" smtClean="0"/>
-              <a:t>2/17/2023</a:t>
+              <a:t>2/21/23</a:t>
             </a:fld>
             <a:endParaRPr lang="en-US"/>
           </a:p>
@@ -1303,7 +1536,7 @@
           <a:p>
             <a:fld id="{68217EAF-5F0D-4A28-B856-1C00EE8A7931}" type="datetimeFigureOut">
               <a:rPr lang="en-US" smtClean="0"/>
-              <a:t>2/17/2023</a:t>
+              <a:t>2/21/23</a:t>
             </a:fld>
             <a:endParaRPr lang="en-US"/>
           </a:p>
@@ -1568,7 +1801,7 @@
           <a:p>
             <a:fld id="{68217EAF-5F0D-4A28-B856-1C00EE8A7931}" type="datetimeFigureOut">
               <a:rPr lang="en-US" smtClean="0"/>
-              <a:t>2/17/2023</a:t>
+              <a:t>2/21/23</a:t>
             </a:fld>
             <a:endParaRPr lang="en-US"/>
           </a:p>
@@ -1980,7 +2213,7 @@
           <a:p>
             <a:fld id="{68217EAF-5F0D-4A28-B856-1C00EE8A7931}" type="datetimeFigureOut">
               <a:rPr lang="en-US" smtClean="0"/>
-              <a:t>2/17/2023</a:t>
+              <a:t>2/21/23</a:t>
             </a:fld>
             <a:endParaRPr lang="en-US"/>
           </a:p>
@@ -2121,7 +2354,7 @@
           <a:p>
             <a:fld id="{68217EAF-5F0D-4A28-B856-1C00EE8A7931}" type="datetimeFigureOut">
               <a:rPr lang="en-US" smtClean="0"/>
-              <a:t>2/17/2023</a:t>
+              <a:t>2/21/23</a:t>
             </a:fld>
             <a:endParaRPr lang="en-US"/>
           </a:p>
@@ -2234,7 +2467,7 @@
           <a:p>
             <a:fld id="{68217EAF-5F0D-4A28-B856-1C00EE8A7931}" type="datetimeFigureOut">
               <a:rPr lang="en-US" smtClean="0"/>
-              <a:t>2/17/2023</a:t>
+              <a:t>2/21/23</a:t>
             </a:fld>
             <a:endParaRPr lang="en-US"/>
           </a:p>
@@ -2545,7 +2778,7 @@
           <a:p>
             <a:fld id="{68217EAF-5F0D-4A28-B856-1C00EE8A7931}" type="datetimeFigureOut">
               <a:rPr lang="en-US" smtClean="0"/>
-              <a:t>2/17/2023</a:t>
+              <a:t>2/21/23</a:t>
             </a:fld>
             <a:endParaRPr lang="en-US"/>
           </a:p>
@@ -2833,7 +3066,7 @@
           <a:p>
             <a:fld id="{68217EAF-5F0D-4A28-B856-1C00EE8A7931}" type="datetimeFigureOut">
               <a:rPr lang="en-US" smtClean="0"/>
-              <a:t>2/17/2023</a:t>
+              <a:t>2/21/23</a:t>
             </a:fld>
             <a:endParaRPr lang="en-US"/>
           </a:p>
@@ -3074,7 +3307,7 @@
           <a:p>
             <a:fld id="{68217EAF-5F0D-4A28-B856-1C00EE8A7931}" type="datetimeFigureOut">
               <a:rPr lang="en-US" smtClean="0"/>
-              <a:t>2/17/2023</a:t>
+              <a:t>2/21/23</a:t>
             </a:fld>
             <a:endParaRPr lang="en-US"/>
           </a:p>
@@ -4569,8 +4802,8 @@
             </a:p>
           </p:txBody>
         </p:sp>
-        <mc:AlternateContent xmlns:mc="http://schemas.openxmlformats.org/markup-compatibility/2006">
-          <mc:Choice xmlns:a14="http://schemas.microsoft.com/office/drawing/2010/main" Requires="a14">
+        <mc:AlternateContent xmlns:mc="http://schemas.openxmlformats.org/markup-compatibility/2006" xmlns:a14="http://schemas.microsoft.com/office/drawing/2010/main">
+          <mc:Choice Requires="a14">
             <p:sp>
               <p:nvSpPr>
                 <p:cNvPr id="27" name="TextBox 26">
@@ -4626,7 +4859,7 @@
               </p:txBody>
             </p:sp>
           </mc:Choice>
-          <mc:Fallback>
+          <mc:Fallback xmlns="">
             <p:sp>
               <p:nvSpPr>
                 <p:cNvPr id="27" name="TextBox 26">
@@ -4723,8 +4956,8 @@
             </a:p>
           </p:txBody>
         </p:sp>
-        <mc:AlternateContent xmlns:mc="http://schemas.openxmlformats.org/markup-compatibility/2006">
-          <mc:Choice xmlns:a14="http://schemas.microsoft.com/office/drawing/2010/main" Requires="a14">
+        <mc:AlternateContent xmlns:mc="http://schemas.openxmlformats.org/markup-compatibility/2006" xmlns:a14="http://schemas.microsoft.com/office/drawing/2010/main">
+          <mc:Choice Requires="a14">
             <p:sp>
               <p:nvSpPr>
                 <p:cNvPr id="29" name="TextBox 28">
@@ -4780,7 +5013,7 @@
               </p:txBody>
             </p:sp>
           </mc:Choice>
-          <mc:Fallback>
+          <mc:Fallback xmlns="">
             <p:sp>
               <p:nvSpPr>
                 <p:cNvPr id="29" name="TextBox 28">
@@ -4830,6 +5063,1409 @@
     <p:extLst>
       <p:ext uri="{BB962C8B-B14F-4D97-AF65-F5344CB8AC3E}">
         <p14:creationId xmlns:p14="http://schemas.microsoft.com/office/powerpoint/2010/main" val="3848685715"/>
+      </p:ext>
+    </p:extLst>
+  </p:cSld>
+  <p:clrMapOvr>
+    <a:masterClrMapping/>
+  </p:clrMapOvr>
+</p:sld>
+</file>
+
+<file path=ppt/slides/slide2.xml><?xml version="1.0" encoding="utf-8"?>
+<p:sld xmlns:a="http://schemas.openxmlformats.org/drawingml/2006/main" xmlns:r="http://schemas.openxmlformats.org/officeDocument/2006/relationships" xmlns:p="http://schemas.openxmlformats.org/presentationml/2006/main">
+  <p:cSld>
+    <p:spTree>
+      <p:nvGrpSpPr>
+        <p:cNvPr id="1" name=""/>
+        <p:cNvGrpSpPr/>
+        <p:nvPr/>
+      </p:nvGrpSpPr>
+      <p:grpSpPr>
+        <a:xfrm>
+          <a:off x="0" y="0"/>
+          <a:ext cx="0" cy="0"/>
+          <a:chOff x="0" y="0"/>
+          <a:chExt cx="0" cy="0"/>
+        </a:xfrm>
+      </p:grpSpPr>
+      <p:sp>
+        <p:nvSpPr>
+          <p:cNvPr id="4" name="Rectangle 3">
+            <a:extLst>
+              <a:ext uri="{FF2B5EF4-FFF2-40B4-BE49-F238E27FC236}">
+                <a16:creationId xmlns:a16="http://schemas.microsoft.com/office/drawing/2014/main" id="{B7DC34CB-47DE-F49C-DF3B-CF0D0DE1CF12}"/>
+              </a:ext>
+            </a:extLst>
+          </p:cNvPr>
+          <p:cNvSpPr/>
+          <p:nvPr/>
+        </p:nvSpPr>
+        <p:spPr>
+          <a:xfrm>
+            <a:off x="4366861" y="2734462"/>
+            <a:ext cx="540000" cy="540000"/>
+          </a:xfrm>
+          <a:prstGeom prst="rect">
+            <a:avLst/>
+          </a:prstGeom>
+          <a:noFill/>
+          <a:ln>
+            <a:solidFill>
+              <a:schemeClr val="tx1"/>
+            </a:solidFill>
+          </a:ln>
+        </p:spPr>
+        <p:style>
+          <a:lnRef idx="2">
+            <a:schemeClr val="accent1">
+              <a:shade val="50000"/>
+            </a:schemeClr>
+          </a:lnRef>
+          <a:fillRef idx="1">
+            <a:schemeClr val="accent1"/>
+          </a:fillRef>
+          <a:effectRef idx="0">
+            <a:schemeClr val="accent1"/>
+          </a:effectRef>
+          <a:fontRef idx="minor">
+            <a:schemeClr val="lt1"/>
+          </a:fontRef>
+        </p:style>
+        <p:txBody>
+          <a:bodyPr rtlCol="0" anchor="ctr"/>
+          <a:lstStyle/>
+          <a:p>
+            <a:pPr algn="ctr"/>
+            <a:endParaRPr lang="en-US"/>
+          </a:p>
+        </p:txBody>
+      </p:sp>
+      <mc:AlternateContent xmlns:mc="http://schemas.openxmlformats.org/markup-compatibility/2006">
+        <mc:Choice xmlns:a14="http://schemas.microsoft.com/office/drawing/2010/main" Requires="a14">
+          <p:sp>
+            <p:nvSpPr>
+              <p:cNvPr id="5" name="TextBox 4">
+                <a:extLst>
+                  <a:ext uri="{FF2B5EF4-FFF2-40B4-BE49-F238E27FC236}">
+                    <a16:creationId xmlns:a16="http://schemas.microsoft.com/office/drawing/2014/main" id="{EF38647B-2D14-4F29-A4C4-F04426FA4E51}"/>
+                  </a:ext>
+                </a:extLst>
+              </p:cNvPr>
+              <p:cNvSpPr txBox="1"/>
+              <p:nvPr/>
+            </p:nvSpPr>
+            <p:spPr>
+              <a:xfrm>
+                <a:off x="4440019" y="2813543"/>
+                <a:ext cx="438838" cy="369332"/>
+              </a:xfrm>
+              <a:prstGeom prst="rect">
+                <a:avLst/>
+              </a:prstGeom>
+              <a:noFill/>
+            </p:spPr>
+            <p:txBody>
+              <a:bodyPr wrap="none" rtlCol="0">
+                <a:spAutoFit/>
+              </a:bodyPr>
+              <a:lstStyle/>
+              <a:p>
+                <a:pPr/>
+                <a14:m>
+                  <m:oMathPara xmlns:m="http://schemas.openxmlformats.org/officeDocument/2006/math">
+                    <m:oMathParaPr>
+                      <m:jc m:val="centerGroup"/>
+                    </m:oMathParaPr>
+                    <m:oMath xmlns:m="http://schemas.openxmlformats.org/officeDocument/2006/math">
+                      <m:sSub>
+                        <m:sSubPr>
+                          <m:ctrlPr>
+                            <a:rPr lang="en-CA" b="0" i="1" smtClean="0">
+                              <a:latin typeface="Cambria Math" panose="02040503050406030204" pitchFamily="18" charset="0"/>
+                            </a:rPr>
+                          </m:ctrlPr>
+                        </m:sSubPr>
+                        <m:e>
+                          <m:r>
+                            <a:rPr lang="en-CA" b="0" i="1" smtClean="0">
+                              <a:latin typeface="Cambria Math" panose="02040503050406030204" pitchFamily="18" charset="0"/>
+                            </a:rPr>
+                            <m:t>𝜇</m:t>
+                          </m:r>
+                        </m:e>
+                        <m:sub>
+                          <m:r>
+                            <a:rPr lang="en-CA" b="0" i="1" smtClean="0">
+                              <a:latin typeface="Cambria Math" panose="02040503050406030204" pitchFamily="18" charset="0"/>
+                            </a:rPr>
+                            <m:t>𝑖</m:t>
+                          </m:r>
+                        </m:sub>
+                      </m:sSub>
+                    </m:oMath>
+                  </m:oMathPara>
+                </a14:m>
+                <a:endParaRPr lang="en-US" dirty="0"/>
+              </a:p>
+            </p:txBody>
+          </p:sp>
+        </mc:Choice>
+        <mc:Fallback>
+          <p:sp>
+            <p:nvSpPr>
+              <p:cNvPr id="5" name="TextBox 4">
+                <a:extLst>
+                  <a:ext uri="{FF2B5EF4-FFF2-40B4-BE49-F238E27FC236}">
+                    <a16:creationId xmlns:a16="http://schemas.microsoft.com/office/drawing/2014/main" id="{EF38647B-2D14-4F29-A4C4-F04426FA4E51}"/>
+                  </a:ext>
+                </a:extLst>
+              </p:cNvPr>
+              <p:cNvSpPr txBox="1">
+                <a:spLocks noRot="1" noChangeAspect="1" noMove="1" noResize="1" noEditPoints="1" noAdjustHandles="1" noChangeArrowheads="1" noChangeShapeType="1" noTextEdit="1"/>
+              </p:cNvSpPr>
+              <p:nvPr/>
+            </p:nvSpPr>
+            <p:spPr>
+              <a:xfrm>
+                <a:off x="4440019" y="2813543"/>
+                <a:ext cx="438838" cy="369332"/>
+              </a:xfrm>
+              <a:prstGeom prst="rect">
+                <a:avLst/>
+              </a:prstGeom>
+              <a:blipFill>
+                <a:blip r:embed="rId2"/>
+                <a:stretch>
+                  <a:fillRect b="-6667"/>
+                </a:stretch>
+              </a:blipFill>
+            </p:spPr>
+            <p:txBody>
+              <a:bodyPr/>
+              <a:lstStyle/>
+              <a:p>
+                <a:r>
+                  <a:rPr lang="en-US">
+                    <a:noFill/>
+                  </a:rPr>
+                  <a:t> </a:t>
+                </a:r>
+              </a:p>
+            </p:txBody>
+          </p:sp>
+        </mc:Fallback>
+      </mc:AlternateContent>
+      <mc:AlternateContent xmlns:mc="http://schemas.openxmlformats.org/markup-compatibility/2006">
+        <mc:Choice xmlns:a14="http://schemas.microsoft.com/office/drawing/2010/main" Requires="a14">
+          <p:sp>
+            <p:nvSpPr>
+              <p:cNvPr id="7" name="TextBox 6">
+                <a:extLst>
+                  <a:ext uri="{FF2B5EF4-FFF2-40B4-BE49-F238E27FC236}">
+                    <a16:creationId xmlns:a16="http://schemas.microsoft.com/office/drawing/2014/main" id="{9DA5E3A8-7CF9-B3D6-CE7D-C5092FC5A82D}"/>
+                  </a:ext>
+                </a:extLst>
+              </p:cNvPr>
+              <p:cNvSpPr txBox="1"/>
+              <p:nvPr/>
+            </p:nvSpPr>
+            <p:spPr>
+              <a:xfrm>
+                <a:off x="5511176" y="1514363"/>
+                <a:ext cx="466217" cy="397545"/>
+              </a:xfrm>
+              <a:prstGeom prst="rect">
+                <a:avLst/>
+              </a:prstGeom>
+              <a:noFill/>
+            </p:spPr>
+            <p:txBody>
+              <a:bodyPr wrap="square" rtlCol="0">
+                <a:spAutoFit/>
+              </a:bodyPr>
+              <a:lstStyle/>
+              <a:p>
+                <a:pPr/>
+                <a14:m>
+                  <m:oMathPara xmlns:m="http://schemas.openxmlformats.org/officeDocument/2006/math">
+                    <m:oMathParaPr>
+                      <m:jc m:val="centerGroup"/>
+                    </m:oMathParaPr>
+                    <m:oMath xmlns:m="http://schemas.openxmlformats.org/officeDocument/2006/math">
+                      <m:sSubSup>
+                        <m:sSubSupPr>
+                          <m:ctrlPr>
+                            <a:rPr lang="en-CA" b="0" i="1" smtClean="0">
+                              <a:latin typeface="Cambria Math" panose="02040503050406030204" pitchFamily="18" charset="0"/>
+                            </a:rPr>
+                          </m:ctrlPr>
+                        </m:sSubSupPr>
+                        <m:e>
+                          <m:r>
+                            <a:rPr lang="en-CA" b="0" i="1" smtClean="0">
+                              <a:latin typeface="Cambria Math" panose="02040503050406030204" pitchFamily="18" charset="0"/>
+                            </a:rPr>
+                            <m:t>𝜎</m:t>
+                          </m:r>
+                        </m:e>
+                        <m:sub/>
+                        <m:sup>
+                          <m:r>
+                            <a:rPr lang="en-CA" b="0" i="1" smtClean="0">
+                              <a:latin typeface="Cambria Math" panose="02040503050406030204" pitchFamily="18" charset="0"/>
+                            </a:rPr>
+                            <m:t>2</m:t>
+                          </m:r>
+                        </m:sup>
+                      </m:sSubSup>
+                    </m:oMath>
+                  </m:oMathPara>
+                </a14:m>
+                <a:endParaRPr lang="en-US" dirty="0"/>
+              </a:p>
+            </p:txBody>
+          </p:sp>
+        </mc:Choice>
+        <mc:Fallback>
+          <p:sp>
+            <p:nvSpPr>
+              <p:cNvPr id="7" name="TextBox 6">
+                <a:extLst>
+                  <a:ext uri="{FF2B5EF4-FFF2-40B4-BE49-F238E27FC236}">
+                    <a16:creationId xmlns:a16="http://schemas.microsoft.com/office/drawing/2014/main" id="{9DA5E3A8-7CF9-B3D6-CE7D-C5092FC5A82D}"/>
+                  </a:ext>
+                </a:extLst>
+              </p:cNvPr>
+              <p:cNvSpPr txBox="1">
+                <a:spLocks noRot="1" noChangeAspect="1" noMove="1" noResize="1" noEditPoints="1" noAdjustHandles="1" noChangeArrowheads="1" noChangeShapeType="1" noTextEdit="1"/>
+              </p:cNvSpPr>
+              <p:nvPr/>
+            </p:nvSpPr>
+            <p:spPr>
+              <a:xfrm>
+                <a:off x="5511176" y="1514363"/>
+                <a:ext cx="466217" cy="397545"/>
+              </a:xfrm>
+              <a:prstGeom prst="rect">
+                <a:avLst/>
+              </a:prstGeom>
+              <a:blipFill>
+                <a:blip r:embed="rId3"/>
+                <a:stretch>
+                  <a:fillRect/>
+                </a:stretch>
+              </a:blipFill>
+            </p:spPr>
+            <p:txBody>
+              <a:bodyPr/>
+              <a:lstStyle/>
+              <a:p>
+                <a:r>
+                  <a:rPr lang="en-US">
+                    <a:noFill/>
+                  </a:rPr>
+                  <a:t> </a:t>
+                </a:r>
+              </a:p>
+            </p:txBody>
+          </p:sp>
+        </mc:Fallback>
+      </mc:AlternateContent>
+      <mc:AlternateContent xmlns:mc="http://schemas.openxmlformats.org/markup-compatibility/2006">
+        <mc:Choice xmlns:a14="http://schemas.microsoft.com/office/drawing/2010/main" Requires="a14">
+          <p:sp>
+            <p:nvSpPr>
+              <p:cNvPr id="10" name="Oval 9">
+                <a:extLst>
+                  <a:ext uri="{FF2B5EF4-FFF2-40B4-BE49-F238E27FC236}">
+                    <a16:creationId xmlns:a16="http://schemas.microsoft.com/office/drawing/2014/main" id="{D0B009ED-32B6-ECFB-EFEF-EE08DEB5111B}"/>
+                  </a:ext>
+                </a:extLst>
+              </p:cNvPr>
+              <p:cNvSpPr/>
+              <p:nvPr/>
+            </p:nvSpPr>
+            <p:spPr>
+              <a:xfrm>
+                <a:off x="4906861" y="3722011"/>
+                <a:ext cx="540000" cy="540000"/>
+              </a:xfrm>
+              <a:prstGeom prst="ellipse">
+                <a:avLst/>
+              </a:prstGeom>
+              <a:noFill/>
+              <a:ln>
+                <a:solidFill>
+                  <a:schemeClr val="tx1"/>
+                </a:solidFill>
+              </a:ln>
+            </p:spPr>
+            <p:style>
+              <a:lnRef idx="2">
+                <a:schemeClr val="accent1">
+                  <a:shade val="50000"/>
+                </a:schemeClr>
+              </a:lnRef>
+              <a:fillRef idx="1">
+                <a:schemeClr val="accent1"/>
+              </a:fillRef>
+              <a:effectRef idx="0">
+                <a:schemeClr val="accent1"/>
+              </a:effectRef>
+              <a:fontRef idx="minor">
+                <a:schemeClr val="lt1"/>
+              </a:fontRef>
+            </p:style>
+            <p:txBody>
+              <a:bodyPr rtlCol="0" anchor="ctr"/>
+              <a:lstStyle/>
+              <a:p>
+                <a:pPr algn="ctr"/>
+                <a14:m>
+                  <m:oMathPara xmlns:m="http://schemas.openxmlformats.org/officeDocument/2006/math">
+                    <m:oMathParaPr>
+                      <m:jc m:val="centerGroup"/>
+                    </m:oMathParaPr>
+                    <m:oMath xmlns:m="http://schemas.openxmlformats.org/officeDocument/2006/math">
+                      <m:sSub>
+                        <m:sSubPr>
+                          <m:ctrlPr>
+                            <a:rPr lang="en-CA" b="0" i="1" smtClean="0">
+                              <a:solidFill>
+                                <a:schemeClr val="tx1"/>
+                              </a:solidFill>
+                              <a:latin typeface="Cambria Math" panose="02040503050406030204" pitchFamily="18" charset="0"/>
+                            </a:rPr>
+                          </m:ctrlPr>
+                        </m:sSubPr>
+                        <m:e>
+                          <m:r>
+                            <a:rPr lang="en-CA" b="0" i="1" smtClean="0">
+                              <a:solidFill>
+                                <a:schemeClr val="tx1"/>
+                              </a:solidFill>
+                              <a:latin typeface="Cambria Math" panose="02040503050406030204" pitchFamily="18" charset="0"/>
+                            </a:rPr>
+                            <m:t>𝑌</m:t>
+                          </m:r>
+                        </m:e>
+                        <m:sub>
+                          <m:r>
+                            <a:rPr lang="en-CA" b="0" i="1" smtClean="0">
+                              <a:solidFill>
+                                <a:schemeClr val="tx1"/>
+                              </a:solidFill>
+                              <a:latin typeface="Cambria Math" panose="02040503050406030204" pitchFamily="18" charset="0"/>
+                            </a:rPr>
+                            <m:t>𝑖</m:t>
+                          </m:r>
+                        </m:sub>
+                      </m:sSub>
+                    </m:oMath>
+                  </m:oMathPara>
+                </a14:m>
+                <a:endParaRPr lang="en-CA" b="0" dirty="0">
+                  <a:solidFill>
+                    <a:schemeClr val="tx1"/>
+                  </a:solidFill>
+                </a:endParaRPr>
+              </a:p>
+            </p:txBody>
+          </p:sp>
+        </mc:Choice>
+        <mc:Fallback>
+          <p:sp>
+            <p:nvSpPr>
+              <p:cNvPr id="10" name="Oval 9">
+                <a:extLst>
+                  <a:ext uri="{FF2B5EF4-FFF2-40B4-BE49-F238E27FC236}">
+                    <a16:creationId xmlns:a16="http://schemas.microsoft.com/office/drawing/2014/main" id="{D0B009ED-32B6-ECFB-EFEF-EE08DEB5111B}"/>
+                  </a:ext>
+                </a:extLst>
+              </p:cNvPr>
+              <p:cNvSpPr>
+                <a:spLocks noRot="1" noChangeAspect="1" noMove="1" noResize="1" noEditPoints="1" noAdjustHandles="1" noChangeArrowheads="1" noChangeShapeType="1" noTextEdit="1"/>
+              </p:cNvSpPr>
+              <p:nvPr/>
+            </p:nvSpPr>
+            <p:spPr>
+              <a:xfrm>
+                <a:off x="4906861" y="3722011"/>
+                <a:ext cx="540000" cy="540000"/>
+              </a:xfrm>
+              <a:prstGeom prst="ellipse">
+                <a:avLst/>
+              </a:prstGeom>
+              <a:blipFill>
+                <a:blip r:embed="rId4"/>
+                <a:stretch>
+                  <a:fillRect/>
+                </a:stretch>
+              </a:blipFill>
+              <a:ln>
+                <a:solidFill>
+                  <a:schemeClr val="tx1"/>
+                </a:solidFill>
+              </a:ln>
+            </p:spPr>
+            <p:txBody>
+              <a:bodyPr/>
+              <a:lstStyle/>
+              <a:p>
+                <a:r>
+                  <a:rPr lang="en-US">
+                    <a:noFill/>
+                  </a:rPr>
+                  <a:t> </a:t>
+                </a:r>
+              </a:p>
+            </p:txBody>
+          </p:sp>
+        </mc:Fallback>
+      </mc:AlternateContent>
+      <p:sp>
+        <p:nvSpPr>
+          <p:cNvPr id="12" name="Rectangle 11">
+            <a:extLst>
+              <a:ext uri="{FF2B5EF4-FFF2-40B4-BE49-F238E27FC236}">
+                <a16:creationId xmlns:a16="http://schemas.microsoft.com/office/drawing/2014/main" id="{C7E76004-2E3B-FC1A-EF5E-019620BEC9BF}"/>
+              </a:ext>
+            </a:extLst>
+          </p:cNvPr>
+          <p:cNvSpPr/>
+          <p:nvPr/>
+        </p:nvSpPr>
+        <p:spPr>
+          <a:xfrm>
+            <a:off x="5437393" y="1429029"/>
+            <a:ext cx="540000" cy="540000"/>
+          </a:xfrm>
+          <a:prstGeom prst="rect">
+            <a:avLst/>
+          </a:prstGeom>
+          <a:noFill/>
+          <a:ln>
+            <a:solidFill>
+              <a:schemeClr val="tx1"/>
+            </a:solidFill>
+          </a:ln>
+        </p:spPr>
+        <p:style>
+          <a:lnRef idx="2">
+            <a:schemeClr val="accent1">
+              <a:shade val="50000"/>
+            </a:schemeClr>
+          </a:lnRef>
+          <a:fillRef idx="1">
+            <a:schemeClr val="accent1"/>
+          </a:fillRef>
+          <a:effectRef idx="0">
+            <a:schemeClr val="accent1"/>
+          </a:effectRef>
+          <a:fontRef idx="minor">
+            <a:schemeClr val="lt1"/>
+          </a:fontRef>
+        </p:style>
+        <p:txBody>
+          <a:bodyPr rtlCol="0" anchor="ctr"/>
+          <a:lstStyle/>
+          <a:p>
+            <a:pPr algn="ctr"/>
+            <a:endParaRPr lang="en-US"/>
+          </a:p>
+        </p:txBody>
+      </p:sp>
+      <p:cxnSp>
+        <p:nvCxnSpPr>
+          <p:cNvPr id="16" name="Straight Arrow Connector 15">
+            <a:extLst>
+              <a:ext uri="{FF2B5EF4-FFF2-40B4-BE49-F238E27FC236}">
+                <a16:creationId xmlns:a16="http://schemas.microsoft.com/office/drawing/2014/main" id="{ADBEDA71-E44D-5775-EE9B-F7C90EC434CA}"/>
+              </a:ext>
+            </a:extLst>
+          </p:cNvPr>
+          <p:cNvCxnSpPr>
+            <a:stCxn id="4" idx="2"/>
+            <a:endCxn id="10" idx="1"/>
+          </p:cNvCxnSpPr>
+          <p:nvPr/>
+        </p:nvCxnSpPr>
+        <p:spPr>
+          <a:xfrm>
+            <a:off x="4636861" y="3274462"/>
+            <a:ext cx="349081" cy="526630"/>
+          </a:xfrm>
+          <a:prstGeom prst="straightConnector1">
+            <a:avLst/>
+          </a:prstGeom>
+          <a:ln>
+            <a:solidFill>
+              <a:schemeClr val="tx1"/>
+            </a:solidFill>
+            <a:tailEnd type="triangle" w="lg" len="lg"/>
+          </a:ln>
+        </p:spPr>
+        <p:style>
+          <a:lnRef idx="1">
+            <a:schemeClr val="accent1"/>
+          </a:lnRef>
+          <a:fillRef idx="0">
+            <a:schemeClr val="accent1"/>
+          </a:fillRef>
+          <a:effectRef idx="0">
+            <a:schemeClr val="accent1"/>
+          </a:effectRef>
+          <a:fontRef idx="minor">
+            <a:schemeClr val="tx1"/>
+          </a:fontRef>
+        </p:style>
+      </p:cxnSp>
+      <p:cxnSp>
+        <p:nvCxnSpPr>
+          <p:cNvPr id="17" name="Straight Arrow Connector 16">
+            <a:extLst>
+              <a:ext uri="{FF2B5EF4-FFF2-40B4-BE49-F238E27FC236}">
+                <a16:creationId xmlns:a16="http://schemas.microsoft.com/office/drawing/2014/main" id="{D58A0CDD-7120-AE0D-6488-D818C68CA3C9}"/>
+              </a:ext>
+            </a:extLst>
+          </p:cNvPr>
+          <p:cNvCxnSpPr>
+            <a:cxnSpLocks/>
+            <a:stCxn id="12" idx="2"/>
+            <a:endCxn id="10" idx="7"/>
+          </p:cNvCxnSpPr>
+          <p:nvPr/>
+        </p:nvCxnSpPr>
+        <p:spPr>
+          <a:xfrm flipH="1">
+            <a:off x="5367780" y="1969029"/>
+            <a:ext cx="339613" cy="1832063"/>
+          </a:xfrm>
+          <a:prstGeom prst="straightConnector1">
+            <a:avLst/>
+          </a:prstGeom>
+          <a:ln>
+            <a:solidFill>
+              <a:schemeClr val="tx1"/>
+            </a:solidFill>
+            <a:tailEnd type="triangle" w="lg" len="lg"/>
+          </a:ln>
+        </p:spPr>
+        <p:style>
+          <a:lnRef idx="1">
+            <a:schemeClr val="accent1"/>
+          </a:lnRef>
+          <a:fillRef idx="0">
+            <a:schemeClr val="accent1"/>
+          </a:fillRef>
+          <a:effectRef idx="0">
+            <a:schemeClr val="accent1"/>
+          </a:effectRef>
+          <a:fontRef idx="minor">
+            <a:schemeClr val="tx1"/>
+          </a:fontRef>
+        </p:style>
+      </p:cxnSp>
+      <p:sp>
+        <p:nvSpPr>
+          <p:cNvPr id="26" name="Rectangle 25">
+            <a:extLst>
+              <a:ext uri="{FF2B5EF4-FFF2-40B4-BE49-F238E27FC236}">
+                <a16:creationId xmlns:a16="http://schemas.microsoft.com/office/drawing/2014/main" id="{F5773DBF-A89C-20F7-96F4-F9EC52BF69B1}"/>
+              </a:ext>
+            </a:extLst>
+          </p:cNvPr>
+          <p:cNvSpPr/>
+          <p:nvPr/>
+        </p:nvSpPr>
+        <p:spPr>
+          <a:xfrm>
+            <a:off x="3118934" y="2564913"/>
+            <a:ext cx="2979846" cy="2324059"/>
+          </a:xfrm>
+          <a:prstGeom prst="rect">
+            <a:avLst/>
+          </a:prstGeom>
+          <a:noFill/>
+          <a:ln>
+            <a:solidFill>
+              <a:schemeClr val="tx1"/>
+            </a:solidFill>
+          </a:ln>
+        </p:spPr>
+        <p:style>
+          <a:lnRef idx="2">
+            <a:schemeClr val="accent1">
+              <a:shade val="50000"/>
+            </a:schemeClr>
+          </a:lnRef>
+          <a:fillRef idx="1">
+            <a:schemeClr val="accent1"/>
+          </a:fillRef>
+          <a:effectRef idx="0">
+            <a:schemeClr val="accent1"/>
+          </a:effectRef>
+          <a:fontRef idx="minor">
+            <a:schemeClr val="lt1"/>
+          </a:fontRef>
+        </p:style>
+        <p:txBody>
+          <a:bodyPr rtlCol="0" anchor="ctr"/>
+          <a:lstStyle/>
+          <a:p>
+            <a:pPr algn="ctr"/>
+            <a:endParaRPr lang="en-US"/>
+          </a:p>
+        </p:txBody>
+      </p:sp>
+      <mc:AlternateContent xmlns:mc="http://schemas.openxmlformats.org/markup-compatibility/2006">
+        <mc:Choice xmlns:a14="http://schemas.microsoft.com/office/drawing/2010/main" Requires="a14">
+          <p:sp>
+            <p:nvSpPr>
+              <p:cNvPr id="27" name="TextBox 26">
+                <a:extLst>
+                  <a:ext uri="{FF2B5EF4-FFF2-40B4-BE49-F238E27FC236}">
+                    <a16:creationId xmlns:a16="http://schemas.microsoft.com/office/drawing/2014/main" id="{2C98168B-D35A-922E-D777-FFA7B4287DDB}"/>
+                  </a:ext>
+                </a:extLst>
+              </p:cNvPr>
+              <p:cNvSpPr txBox="1"/>
+              <p:nvPr/>
+            </p:nvSpPr>
+            <p:spPr>
+              <a:xfrm>
+                <a:off x="3248364" y="4405957"/>
+                <a:ext cx="1244251" cy="369332"/>
+              </a:xfrm>
+              <a:prstGeom prst="rect">
+                <a:avLst/>
+              </a:prstGeom>
+              <a:noFill/>
+            </p:spPr>
+            <p:txBody>
+              <a:bodyPr wrap="none" rtlCol="0">
+                <a:spAutoFit/>
+              </a:bodyPr>
+              <a:lstStyle/>
+              <a:p>
+                <a:pPr/>
+                <a:r>
+                  <a:rPr lang="en-CA" i="1" dirty="0"/>
+                  <a:t>i</a:t>
+                </a:r>
+                <a14:m>
+                  <m:oMath xmlns:m="http://schemas.openxmlformats.org/officeDocument/2006/math">
+                    <m:r>
+                      <a:rPr lang="en-CA" b="0" i="1" smtClean="0">
+                        <a:latin typeface="Cambria Math" panose="02040503050406030204" pitchFamily="18" charset="0"/>
+                      </a:rPr>
+                      <m:t>=1,…,</m:t>
+                    </m:r>
+                    <m:r>
+                      <a:rPr lang="en-CA" b="0" i="1" smtClean="0">
+                        <a:latin typeface="Cambria Math" panose="02040503050406030204" pitchFamily="18" charset="0"/>
+                      </a:rPr>
+                      <m:t>5</m:t>
+                    </m:r>
+                    <m:r>
+                      <a:rPr lang="en-CA" b="0" i="1" smtClean="0">
+                        <a:latin typeface="Cambria Math" panose="02040503050406030204" pitchFamily="18" charset="0"/>
+                      </a:rPr>
+                      <m:t>0</m:t>
+                    </m:r>
+                  </m:oMath>
+                </a14:m>
+                <a:endParaRPr lang="en-CA" b="0" dirty="0"/>
+              </a:p>
+            </p:txBody>
+          </p:sp>
+        </mc:Choice>
+        <mc:Fallback>
+          <p:sp>
+            <p:nvSpPr>
+              <p:cNvPr id="27" name="TextBox 26">
+                <a:extLst>
+                  <a:ext uri="{FF2B5EF4-FFF2-40B4-BE49-F238E27FC236}">
+                    <a16:creationId xmlns:a16="http://schemas.microsoft.com/office/drawing/2014/main" id="{2C98168B-D35A-922E-D777-FFA7B4287DDB}"/>
+                  </a:ext>
+                </a:extLst>
+              </p:cNvPr>
+              <p:cNvSpPr txBox="1">
+                <a:spLocks noRot="1" noChangeAspect="1" noMove="1" noResize="1" noEditPoints="1" noAdjustHandles="1" noChangeArrowheads="1" noChangeShapeType="1" noTextEdit="1"/>
+              </p:cNvSpPr>
+              <p:nvPr/>
+            </p:nvSpPr>
+            <p:spPr>
+              <a:xfrm>
+                <a:off x="3248364" y="4405957"/>
+                <a:ext cx="1244251" cy="369332"/>
+              </a:xfrm>
+              <a:prstGeom prst="rect">
+                <a:avLst/>
+              </a:prstGeom>
+              <a:blipFill>
+                <a:blip r:embed="rId5"/>
+                <a:stretch>
+                  <a:fillRect l="-4040" t="-10345" b="-27586"/>
+                </a:stretch>
+              </a:blipFill>
+            </p:spPr>
+            <p:txBody>
+              <a:bodyPr/>
+              <a:lstStyle/>
+              <a:p>
+                <a:r>
+                  <a:rPr lang="en-US">
+                    <a:noFill/>
+                  </a:rPr>
+                  <a:t> </a:t>
+                </a:r>
+              </a:p>
+            </p:txBody>
+          </p:sp>
+        </mc:Fallback>
+      </mc:AlternateContent>
+      <p:sp>
+        <p:nvSpPr>
+          <p:cNvPr id="6" name="Rectangle 5">
+            <a:extLst>
+              <a:ext uri="{FF2B5EF4-FFF2-40B4-BE49-F238E27FC236}">
+                <a16:creationId xmlns:a16="http://schemas.microsoft.com/office/drawing/2014/main" id="{666CB5AE-6497-7D11-B6A5-9DFEFEC9C4B4}"/>
+              </a:ext>
+            </a:extLst>
+          </p:cNvPr>
+          <p:cNvSpPr/>
+          <p:nvPr/>
+        </p:nvSpPr>
+        <p:spPr>
+          <a:xfrm>
+            <a:off x="3248364" y="2734462"/>
+            <a:ext cx="540000" cy="540000"/>
+          </a:xfrm>
+          <a:prstGeom prst="rect">
+            <a:avLst/>
+          </a:prstGeom>
+          <a:noFill/>
+          <a:ln>
+            <a:solidFill>
+              <a:schemeClr val="tx1"/>
+            </a:solidFill>
+          </a:ln>
+        </p:spPr>
+        <p:style>
+          <a:lnRef idx="2">
+            <a:schemeClr val="accent1">
+              <a:shade val="50000"/>
+            </a:schemeClr>
+          </a:lnRef>
+          <a:fillRef idx="1">
+            <a:schemeClr val="accent1"/>
+          </a:fillRef>
+          <a:effectRef idx="0">
+            <a:schemeClr val="accent1"/>
+          </a:effectRef>
+          <a:fontRef idx="minor">
+            <a:schemeClr val="lt1"/>
+          </a:fontRef>
+        </p:style>
+        <p:txBody>
+          <a:bodyPr rtlCol="0" anchor="ctr"/>
+          <a:lstStyle/>
+          <a:p>
+            <a:pPr algn="ctr"/>
+            <a:endParaRPr lang="en-US"/>
+          </a:p>
+        </p:txBody>
+      </p:sp>
+      <mc:AlternateContent xmlns:mc="http://schemas.openxmlformats.org/markup-compatibility/2006">
+        <mc:Choice xmlns:a14="http://schemas.microsoft.com/office/drawing/2010/main" Requires="a14">
+          <p:sp>
+            <p:nvSpPr>
+              <p:cNvPr id="8" name="TextBox 7">
+                <a:extLst>
+                  <a:ext uri="{FF2B5EF4-FFF2-40B4-BE49-F238E27FC236}">
+                    <a16:creationId xmlns:a16="http://schemas.microsoft.com/office/drawing/2014/main" id="{6BD53912-FF0E-EC58-92F6-8A4A18485BC2}"/>
+                  </a:ext>
+                </a:extLst>
+              </p:cNvPr>
+              <p:cNvSpPr txBox="1"/>
+              <p:nvPr/>
+            </p:nvSpPr>
+            <p:spPr>
+              <a:xfrm>
+                <a:off x="3354976" y="2821416"/>
+                <a:ext cx="433388" cy="369332"/>
+              </a:xfrm>
+              <a:prstGeom prst="rect">
+                <a:avLst/>
+              </a:prstGeom>
+              <a:noFill/>
+            </p:spPr>
+            <p:txBody>
+              <a:bodyPr wrap="none" rtlCol="0">
+                <a:spAutoFit/>
+              </a:bodyPr>
+              <a:lstStyle/>
+              <a:p>
+                <a14:m>
+                  <m:oMathPara xmlns:m="http://schemas.openxmlformats.org/officeDocument/2006/math">
+                    <m:oMathParaPr>
+                      <m:jc m:val="centerGroup"/>
+                    </m:oMathParaPr>
+                    <m:oMath xmlns:m="http://schemas.openxmlformats.org/officeDocument/2006/math">
+                      <m:sSub>
+                        <m:sSubPr>
+                          <m:ctrlPr>
+                            <a:rPr lang="en-CA" b="0" i="1" smtClean="0">
+                              <a:latin typeface="Cambria Math" panose="02040503050406030204" pitchFamily="18" charset="0"/>
+                            </a:rPr>
+                          </m:ctrlPr>
+                        </m:sSubPr>
+                        <m:e>
+                          <m:r>
+                            <a:rPr lang="en-CA" b="0" i="1" smtClean="0">
+                              <a:latin typeface="Cambria Math" panose="02040503050406030204" pitchFamily="18" charset="0"/>
+                            </a:rPr>
+                            <m:t>𝑥</m:t>
+                          </m:r>
+                        </m:e>
+                        <m:sub>
+                          <m:r>
+                            <a:rPr lang="en-CA" b="0" i="1" smtClean="0">
+                              <a:latin typeface="Cambria Math" panose="02040503050406030204" pitchFamily="18" charset="0"/>
+                            </a:rPr>
+                            <m:t>𝑖</m:t>
+                          </m:r>
+                        </m:sub>
+                      </m:sSub>
+                    </m:oMath>
+                  </m:oMathPara>
+                </a14:m>
+                <a:endParaRPr lang="en-CA" b="0" dirty="0"/>
+              </a:p>
+            </p:txBody>
+          </p:sp>
+        </mc:Choice>
+        <mc:Fallback>
+          <p:sp>
+            <p:nvSpPr>
+              <p:cNvPr id="8" name="TextBox 7">
+                <a:extLst>
+                  <a:ext uri="{FF2B5EF4-FFF2-40B4-BE49-F238E27FC236}">
+                    <a16:creationId xmlns:a16="http://schemas.microsoft.com/office/drawing/2014/main" id="{6BD53912-FF0E-EC58-92F6-8A4A18485BC2}"/>
+                  </a:ext>
+                </a:extLst>
+              </p:cNvPr>
+              <p:cNvSpPr txBox="1">
+                <a:spLocks noRot="1" noChangeAspect="1" noMove="1" noResize="1" noEditPoints="1" noAdjustHandles="1" noChangeArrowheads="1" noChangeShapeType="1" noTextEdit="1"/>
+              </p:cNvSpPr>
+              <p:nvPr/>
+            </p:nvSpPr>
+            <p:spPr>
+              <a:xfrm>
+                <a:off x="3354976" y="2821416"/>
+                <a:ext cx="433388" cy="369332"/>
+              </a:xfrm>
+              <a:prstGeom prst="rect">
+                <a:avLst/>
+              </a:prstGeom>
+              <a:blipFill>
+                <a:blip r:embed="rId6"/>
+                <a:stretch>
+                  <a:fillRect/>
+                </a:stretch>
+              </a:blipFill>
+            </p:spPr>
+            <p:txBody>
+              <a:bodyPr/>
+              <a:lstStyle/>
+              <a:p>
+                <a:r>
+                  <a:rPr lang="en-US">
+                    <a:noFill/>
+                  </a:rPr>
+                  <a:t> </a:t>
+                </a:r>
+              </a:p>
+            </p:txBody>
+          </p:sp>
+        </mc:Fallback>
+      </mc:AlternateContent>
+      <p:cxnSp>
+        <p:nvCxnSpPr>
+          <p:cNvPr id="18" name="Straight Arrow Connector 17">
+            <a:extLst>
+              <a:ext uri="{FF2B5EF4-FFF2-40B4-BE49-F238E27FC236}">
+                <a16:creationId xmlns:a16="http://schemas.microsoft.com/office/drawing/2014/main" id="{EB7DAEEE-7B91-59AC-03D2-FE624A485EA7}"/>
+              </a:ext>
+            </a:extLst>
+          </p:cNvPr>
+          <p:cNvCxnSpPr>
+            <a:cxnSpLocks/>
+            <a:stCxn id="8" idx="3"/>
+            <a:endCxn id="4" idx="1"/>
+          </p:cNvCxnSpPr>
+          <p:nvPr/>
+        </p:nvCxnSpPr>
+        <p:spPr>
+          <a:xfrm flipV="1">
+            <a:off x="3788364" y="3004462"/>
+            <a:ext cx="578497" cy="1620"/>
+          </a:xfrm>
+          <a:prstGeom prst="straightConnector1">
+            <a:avLst/>
+          </a:prstGeom>
+          <a:ln>
+            <a:solidFill>
+              <a:schemeClr val="tx1"/>
+            </a:solidFill>
+            <a:tailEnd type="triangle" w="lg" len="lg"/>
+          </a:ln>
+        </p:spPr>
+        <p:style>
+          <a:lnRef idx="1">
+            <a:schemeClr val="accent1"/>
+          </a:lnRef>
+          <a:fillRef idx="0">
+            <a:schemeClr val="accent1"/>
+          </a:fillRef>
+          <a:effectRef idx="0">
+            <a:schemeClr val="accent1"/>
+          </a:effectRef>
+          <a:fontRef idx="minor">
+            <a:schemeClr val="tx1"/>
+          </a:fontRef>
+        </p:style>
+      </p:cxnSp>
+      <mc:AlternateContent xmlns:mc="http://schemas.openxmlformats.org/markup-compatibility/2006">
+        <mc:Choice xmlns:a14="http://schemas.microsoft.com/office/drawing/2010/main" Requires="a14">
+          <p:sp>
+            <p:nvSpPr>
+              <p:cNvPr id="24" name="TextBox 23">
+                <a:extLst>
+                  <a:ext uri="{FF2B5EF4-FFF2-40B4-BE49-F238E27FC236}">
+                    <a16:creationId xmlns:a16="http://schemas.microsoft.com/office/drawing/2014/main" id="{0366CFE7-0B94-71CC-C53D-E1DAA8698E24}"/>
+                  </a:ext>
+                </a:extLst>
+              </p:cNvPr>
+              <p:cNvSpPr txBox="1"/>
+              <p:nvPr/>
+            </p:nvSpPr>
+            <p:spPr>
+              <a:xfrm>
+                <a:off x="4412640" y="1533986"/>
+                <a:ext cx="466217" cy="369332"/>
+              </a:xfrm>
+              <a:prstGeom prst="rect">
+                <a:avLst/>
+              </a:prstGeom>
+              <a:noFill/>
+            </p:spPr>
+            <p:txBody>
+              <a:bodyPr wrap="square" rtlCol="0">
+                <a:spAutoFit/>
+              </a:bodyPr>
+              <a:lstStyle/>
+              <a:p>
+                <a:pPr/>
+                <a14:m>
+                  <m:oMathPara xmlns:m="http://schemas.openxmlformats.org/officeDocument/2006/math">
+                    <m:oMathParaPr>
+                      <m:jc m:val="centerGroup"/>
+                    </m:oMathParaPr>
+                    <m:oMath xmlns:m="http://schemas.openxmlformats.org/officeDocument/2006/math">
+                      <m:sSub>
+                        <m:sSubPr>
+                          <m:ctrlPr>
+                            <a:rPr lang="en-CA" b="0" i="1" smtClean="0">
+                              <a:latin typeface="Cambria Math" panose="02040503050406030204" pitchFamily="18" charset="0"/>
+                            </a:rPr>
+                          </m:ctrlPr>
+                        </m:sSubPr>
+                        <m:e>
+                          <m:r>
+                            <a:rPr lang="en-CA" b="0" i="1" smtClean="0">
+                              <a:latin typeface="Cambria Math" panose="02040503050406030204" pitchFamily="18" charset="0"/>
+                            </a:rPr>
+                            <m:t>𝛽</m:t>
+                          </m:r>
+                        </m:e>
+                        <m:sub>
+                          <m:r>
+                            <a:rPr lang="en-CA" b="0" i="1" smtClean="0">
+                              <a:latin typeface="Cambria Math" panose="02040503050406030204" pitchFamily="18" charset="0"/>
+                            </a:rPr>
+                            <m:t>1</m:t>
+                          </m:r>
+                        </m:sub>
+                      </m:sSub>
+                    </m:oMath>
+                  </m:oMathPara>
+                </a14:m>
+                <a:endParaRPr lang="en-US" dirty="0"/>
+              </a:p>
+            </p:txBody>
+          </p:sp>
+        </mc:Choice>
+        <mc:Fallback>
+          <p:sp>
+            <p:nvSpPr>
+              <p:cNvPr id="24" name="TextBox 23">
+                <a:extLst>
+                  <a:ext uri="{FF2B5EF4-FFF2-40B4-BE49-F238E27FC236}">
+                    <a16:creationId xmlns:a16="http://schemas.microsoft.com/office/drawing/2014/main" id="{0366CFE7-0B94-71CC-C53D-E1DAA8698E24}"/>
+                  </a:ext>
+                </a:extLst>
+              </p:cNvPr>
+              <p:cNvSpPr txBox="1">
+                <a:spLocks noRot="1" noChangeAspect="1" noMove="1" noResize="1" noEditPoints="1" noAdjustHandles="1" noChangeArrowheads="1" noChangeShapeType="1" noTextEdit="1"/>
+              </p:cNvSpPr>
+              <p:nvPr/>
+            </p:nvSpPr>
+            <p:spPr>
+              <a:xfrm>
+                <a:off x="4412640" y="1533986"/>
+                <a:ext cx="466217" cy="369332"/>
+              </a:xfrm>
+              <a:prstGeom prst="rect">
+                <a:avLst/>
+              </a:prstGeom>
+              <a:blipFill>
+                <a:blip r:embed="rId7"/>
+                <a:stretch>
+                  <a:fillRect b="-16667"/>
+                </a:stretch>
+              </a:blipFill>
+            </p:spPr>
+            <p:txBody>
+              <a:bodyPr/>
+              <a:lstStyle/>
+              <a:p>
+                <a:r>
+                  <a:rPr lang="en-US">
+                    <a:noFill/>
+                  </a:rPr>
+                  <a:t> </a:t>
+                </a:r>
+              </a:p>
+            </p:txBody>
+          </p:sp>
+        </mc:Fallback>
+      </mc:AlternateContent>
+      <p:sp>
+        <p:nvSpPr>
+          <p:cNvPr id="25" name="Rectangle 24">
+            <a:extLst>
+              <a:ext uri="{FF2B5EF4-FFF2-40B4-BE49-F238E27FC236}">
+                <a16:creationId xmlns:a16="http://schemas.microsoft.com/office/drawing/2014/main" id="{7DECB3BC-7DE9-3EDB-F779-0B2177FDBBDC}"/>
+              </a:ext>
+            </a:extLst>
+          </p:cNvPr>
+          <p:cNvSpPr/>
+          <p:nvPr/>
+        </p:nvSpPr>
+        <p:spPr>
+          <a:xfrm>
+            <a:off x="4338857" y="1448652"/>
+            <a:ext cx="540000" cy="540000"/>
+          </a:xfrm>
+          <a:prstGeom prst="rect">
+            <a:avLst/>
+          </a:prstGeom>
+          <a:noFill/>
+          <a:ln>
+            <a:solidFill>
+              <a:schemeClr val="tx1"/>
+            </a:solidFill>
+          </a:ln>
+        </p:spPr>
+        <p:style>
+          <a:lnRef idx="2">
+            <a:schemeClr val="accent1">
+              <a:shade val="50000"/>
+            </a:schemeClr>
+          </a:lnRef>
+          <a:fillRef idx="1">
+            <a:schemeClr val="accent1"/>
+          </a:fillRef>
+          <a:effectRef idx="0">
+            <a:schemeClr val="accent1"/>
+          </a:effectRef>
+          <a:fontRef idx="minor">
+            <a:schemeClr val="lt1"/>
+          </a:fontRef>
+        </p:style>
+        <p:txBody>
+          <a:bodyPr rtlCol="0" anchor="ctr"/>
+          <a:lstStyle/>
+          <a:p>
+            <a:pPr algn="ctr"/>
+            <a:endParaRPr lang="en-US"/>
+          </a:p>
+        </p:txBody>
+      </p:sp>
+      <mc:AlternateContent xmlns:mc="http://schemas.openxmlformats.org/markup-compatibility/2006">
+        <mc:Choice xmlns:a14="http://schemas.microsoft.com/office/drawing/2010/main" Requires="a14">
+          <p:sp>
+            <p:nvSpPr>
+              <p:cNvPr id="31" name="TextBox 30">
+                <a:extLst>
+                  <a:ext uri="{FF2B5EF4-FFF2-40B4-BE49-F238E27FC236}">
+                    <a16:creationId xmlns:a16="http://schemas.microsoft.com/office/drawing/2014/main" id="{0D1D3CC1-3ECD-9E99-924E-F8375F53B4F4}"/>
+                  </a:ext>
+                </a:extLst>
+              </p:cNvPr>
+              <p:cNvSpPr txBox="1"/>
+              <p:nvPr/>
+            </p:nvSpPr>
+            <p:spPr>
+              <a:xfrm>
+                <a:off x="3312679" y="1536420"/>
+                <a:ext cx="466217" cy="369332"/>
+              </a:xfrm>
+              <a:prstGeom prst="rect">
+                <a:avLst/>
+              </a:prstGeom>
+              <a:noFill/>
+            </p:spPr>
+            <p:txBody>
+              <a:bodyPr wrap="square" rtlCol="0">
+                <a:spAutoFit/>
+              </a:bodyPr>
+              <a:lstStyle/>
+              <a:p>
+                <a:pPr/>
+                <a14:m>
+                  <m:oMathPara xmlns:m="http://schemas.openxmlformats.org/officeDocument/2006/math">
+                    <m:oMathParaPr>
+                      <m:jc m:val="centerGroup"/>
+                    </m:oMathParaPr>
+                    <m:oMath xmlns:m="http://schemas.openxmlformats.org/officeDocument/2006/math">
+                      <m:sSub>
+                        <m:sSubPr>
+                          <m:ctrlPr>
+                            <a:rPr lang="en-CA" b="0" i="1" smtClean="0">
+                              <a:latin typeface="Cambria Math" panose="02040503050406030204" pitchFamily="18" charset="0"/>
+                            </a:rPr>
+                          </m:ctrlPr>
+                        </m:sSubPr>
+                        <m:e>
+                          <m:r>
+                            <a:rPr lang="en-CA" b="0" i="1" smtClean="0">
+                              <a:latin typeface="Cambria Math" panose="02040503050406030204" pitchFamily="18" charset="0"/>
+                            </a:rPr>
+                            <m:t>𝛽</m:t>
+                          </m:r>
+                        </m:e>
+                        <m:sub>
+                          <m:r>
+                            <a:rPr lang="en-CA" b="0" i="1" smtClean="0">
+                              <a:latin typeface="Cambria Math" panose="02040503050406030204" pitchFamily="18" charset="0"/>
+                            </a:rPr>
+                            <m:t>0</m:t>
+                          </m:r>
+                        </m:sub>
+                      </m:sSub>
+                    </m:oMath>
+                  </m:oMathPara>
+                </a14:m>
+                <a:endParaRPr lang="en-US" dirty="0"/>
+              </a:p>
+            </p:txBody>
+          </p:sp>
+        </mc:Choice>
+        <mc:Fallback>
+          <p:sp>
+            <p:nvSpPr>
+              <p:cNvPr id="31" name="TextBox 30">
+                <a:extLst>
+                  <a:ext uri="{FF2B5EF4-FFF2-40B4-BE49-F238E27FC236}">
+                    <a16:creationId xmlns:a16="http://schemas.microsoft.com/office/drawing/2014/main" id="{0D1D3CC1-3ECD-9E99-924E-F8375F53B4F4}"/>
+                  </a:ext>
+                </a:extLst>
+              </p:cNvPr>
+              <p:cNvSpPr txBox="1">
+                <a:spLocks noRot="1" noChangeAspect="1" noMove="1" noResize="1" noEditPoints="1" noAdjustHandles="1" noChangeArrowheads="1" noChangeShapeType="1" noTextEdit="1"/>
+              </p:cNvSpPr>
+              <p:nvPr/>
+            </p:nvSpPr>
+            <p:spPr>
+              <a:xfrm>
+                <a:off x="3312679" y="1536420"/>
+                <a:ext cx="466217" cy="369332"/>
+              </a:xfrm>
+              <a:prstGeom prst="rect">
+                <a:avLst/>
+              </a:prstGeom>
+              <a:blipFill>
+                <a:blip r:embed="rId8"/>
+                <a:stretch>
+                  <a:fillRect b="-12903"/>
+                </a:stretch>
+              </a:blipFill>
+            </p:spPr>
+            <p:txBody>
+              <a:bodyPr/>
+              <a:lstStyle/>
+              <a:p>
+                <a:r>
+                  <a:rPr lang="en-US">
+                    <a:noFill/>
+                  </a:rPr>
+                  <a:t> </a:t>
+                </a:r>
+              </a:p>
+            </p:txBody>
+          </p:sp>
+        </mc:Fallback>
+      </mc:AlternateContent>
+      <p:sp>
+        <p:nvSpPr>
+          <p:cNvPr id="32" name="Rectangle 31">
+            <a:extLst>
+              <a:ext uri="{FF2B5EF4-FFF2-40B4-BE49-F238E27FC236}">
+                <a16:creationId xmlns:a16="http://schemas.microsoft.com/office/drawing/2014/main" id="{4CF229E6-3F8D-CE6C-F3AE-141C4A636B0F}"/>
+              </a:ext>
+            </a:extLst>
+          </p:cNvPr>
+          <p:cNvSpPr/>
+          <p:nvPr/>
+        </p:nvSpPr>
+        <p:spPr>
+          <a:xfrm>
+            <a:off x="3238896" y="1451086"/>
+            <a:ext cx="540000" cy="540000"/>
+          </a:xfrm>
+          <a:prstGeom prst="rect">
+            <a:avLst/>
+          </a:prstGeom>
+          <a:noFill/>
+          <a:ln>
+            <a:solidFill>
+              <a:schemeClr val="tx1"/>
+            </a:solidFill>
+          </a:ln>
+        </p:spPr>
+        <p:style>
+          <a:lnRef idx="2">
+            <a:schemeClr val="accent1">
+              <a:shade val="50000"/>
+            </a:schemeClr>
+          </a:lnRef>
+          <a:fillRef idx="1">
+            <a:schemeClr val="accent1"/>
+          </a:fillRef>
+          <a:effectRef idx="0">
+            <a:schemeClr val="accent1"/>
+          </a:effectRef>
+          <a:fontRef idx="minor">
+            <a:schemeClr val="lt1"/>
+          </a:fontRef>
+        </p:style>
+        <p:txBody>
+          <a:bodyPr rtlCol="0" anchor="ctr"/>
+          <a:lstStyle/>
+          <a:p>
+            <a:pPr algn="ctr"/>
+            <a:endParaRPr lang="en-US"/>
+          </a:p>
+        </p:txBody>
+      </p:sp>
+      <p:cxnSp>
+        <p:nvCxnSpPr>
+          <p:cNvPr id="33" name="Straight Arrow Connector 32">
+            <a:extLst>
+              <a:ext uri="{FF2B5EF4-FFF2-40B4-BE49-F238E27FC236}">
+                <a16:creationId xmlns:a16="http://schemas.microsoft.com/office/drawing/2014/main" id="{9561C585-8886-7A28-61BA-C330B780C927}"/>
+              </a:ext>
+            </a:extLst>
+          </p:cNvPr>
+          <p:cNvCxnSpPr>
+            <a:cxnSpLocks/>
+            <a:stCxn id="32" idx="2"/>
+          </p:cNvCxnSpPr>
+          <p:nvPr/>
+        </p:nvCxnSpPr>
+        <p:spPr>
+          <a:xfrm>
+            <a:off x="3508896" y="1991086"/>
+            <a:ext cx="1118497" cy="724139"/>
+          </a:xfrm>
+          <a:prstGeom prst="straightConnector1">
+            <a:avLst/>
+          </a:prstGeom>
+          <a:ln>
+            <a:solidFill>
+              <a:schemeClr val="tx1"/>
+            </a:solidFill>
+            <a:tailEnd type="triangle" w="lg" len="lg"/>
+          </a:ln>
+        </p:spPr>
+        <p:style>
+          <a:lnRef idx="1">
+            <a:schemeClr val="accent1"/>
+          </a:lnRef>
+          <a:fillRef idx="0">
+            <a:schemeClr val="accent1"/>
+          </a:fillRef>
+          <a:effectRef idx="0">
+            <a:schemeClr val="accent1"/>
+          </a:effectRef>
+          <a:fontRef idx="minor">
+            <a:schemeClr val="tx1"/>
+          </a:fontRef>
+        </p:style>
+      </p:cxnSp>
+      <p:cxnSp>
+        <p:nvCxnSpPr>
+          <p:cNvPr id="36" name="Straight Arrow Connector 35">
+            <a:extLst>
+              <a:ext uri="{FF2B5EF4-FFF2-40B4-BE49-F238E27FC236}">
+                <a16:creationId xmlns:a16="http://schemas.microsoft.com/office/drawing/2014/main" id="{DA288777-66A9-C4FD-EFDF-9974BF412930}"/>
+              </a:ext>
+            </a:extLst>
+          </p:cNvPr>
+          <p:cNvCxnSpPr>
+            <a:cxnSpLocks/>
+            <a:stCxn id="25" idx="2"/>
+          </p:cNvCxnSpPr>
+          <p:nvPr/>
+        </p:nvCxnSpPr>
+        <p:spPr>
+          <a:xfrm>
+            <a:off x="4608857" y="1988652"/>
+            <a:ext cx="28004" cy="689911"/>
+          </a:xfrm>
+          <a:prstGeom prst="straightConnector1">
+            <a:avLst/>
+          </a:prstGeom>
+          <a:ln>
+            <a:solidFill>
+              <a:schemeClr val="tx1"/>
+            </a:solidFill>
+            <a:tailEnd type="triangle" w="lg" len="lg"/>
+          </a:ln>
+        </p:spPr>
+        <p:style>
+          <a:lnRef idx="1">
+            <a:schemeClr val="accent1"/>
+          </a:lnRef>
+          <a:fillRef idx="0">
+            <a:schemeClr val="accent1"/>
+          </a:fillRef>
+          <a:effectRef idx="0">
+            <a:schemeClr val="accent1"/>
+          </a:effectRef>
+          <a:fontRef idx="minor">
+            <a:schemeClr val="tx1"/>
+          </a:fontRef>
+        </p:style>
+      </p:cxnSp>
+    </p:spTree>
+    <p:extLst>
+      <p:ext uri="{BB962C8B-B14F-4D97-AF65-F5344CB8AC3E}">
+        <p14:creationId xmlns:p14="http://schemas.microsoft.com/office/powerpoint/2010/main" val="2718581900"/>
       </p:ext>
     </p:extLst>
   </p:cSld>

</xml_diff>